<commit_message>
Primary improvement of presentation
</commit_message>
<xml_diff>
--- a/Выступление/Презентация.pptx
+++ b/Выступление/Презентация.pptx
@@ -5,27 +5,28 @@
     <p:sldMasterId id="2147483786" r:id="rId1"/>
   </p:sldMasterIdLst>
   <p:notesMasterIdLst>
-    <p:notesMasterId r:id="rId20"/>
+    <p:notesMasterId r:id="rId21"/>
   </p:notesMasterIdLst>
   <p:sldIdLst>
     <p:sldId id="256" r:id="rId2"/>
     <p:sldId id="257" r:id="rId3"/>
     <p:sldId id="258" r:id="rId4"/>
     <p:sldId id="259" r:id="rId5"/>
-    <p:sldId id="260" r:id="rId6"/>
-    <p:sldId id="264" r:id="rId7"/>
-    <p:sldId id="261" r:id="rId8"/>
-    <p:sldId id="262" r:id="rId9"/>
-    <p:sldId id="263" r:id="rId10"/>
-    <p:sldId id="265" r:id="rId11"/>
-    <p:sldId id="266" r:id="rId12"/>
-    <p:sldId id="268" r:id="rId13"/>
-    <p:sldId id="269" r:id="rId14"/>
-    <p:sldId id="270" r:id="rId15"/>
-    <p:sldId id="271" r:id="rId16"/>
-    <p:sldId id="272" r:id="rId17"/>
-    <p:sldId id="267" r:id="rId18"/>
-    <p:sldId id="273" r:id="rId19"/>
+    <p:sldId id="264" r:id="rId6"/>
+    <p:sldId id="263" r:id="rId7"/>
+    <p:sldId id="265" r:id="rId8"/>
+    <p:sldId id="266" r:id="rId9"/>
+    <p:sldId id="275" r:id="rId10"/>
+    <p:sldId id="268" r:id="rId11"/>
+    <p:sldId id="269" r:id="rId12"/>
+    <p:sldId id="270" r:id="rId13"/>
+    <p:sldId id="271" r:id="rId14"/>
+    <p:sldId id="272" r:id="rId15"/>
+    <p:sldId id="267" r:id="rId16"/>
+    <p:sldId id="273" r:id="rId17"/>
+    <p:sldId id="260" r:id="rId18"/>
+    <p:sldId id="274" r:id="rId19"/>
+    <p:sldId id="261" r:id="rId20"/>
   </p:sldIdLst>
   <p:sldSz cx="12192000" cy="6858000"/>
   <p:notesSz cx="6858000" cy="9144000"/>
@@ -214,7 +215,7 @@
           <a:p>
             <a:fld id="{C4EBA997-E575-4723-9C6A-362015682137}" type="datetimeFigureOut">
               <a:rPr lang="ru-RU" smtClean="0"/>
-              <a:t>21.06.2020</a:t>
+              <a:t>22.06.2020</a:t>
             </a:fld>
             <a:endParaRPr lang="ru-RU"/>
           </a:p>
@@ -708,7 +709,7 @@
           <a:p>
             <a:fld id="{0B1A07F4-E76F-46F3-A55D-9A719761D872}" type="datetime1">
               <a:rPr lang="ru-RU" smtClean="0"/>
-              <a:t>21.06.2020</a:t>
+              <a:t>22.06.2020</a:t>
             </a:fld>
             <a:endParaRPr lang="ru-RU"/>
           </a:p>
@@ -920,7 +921,7 @@
           <a:p>
             <a:fld id="{9A21BB48-08C0-4383-BBFE-54F1B01738BE}" type="datetime1">
               <a:rPr lang="ru-RU" smtClean="0"/>
-              <a:t>21.06.2020</a:t>
+              <a:t>22.06.2020</a:t>
             </a:fld>
             <a:endParaRPr lang="ru-RU"/>
           </a:p>
@@ -1180,7 +1181,7 @@
           <a:p>
             <a:fld id="{C9E7E855-19F9-4B7F-B937-85C481C92AF6}" type="datetime1">
               <a:rPr lang="ru-RU" smtClean="0"/>
-              <a:t>21.06.2020</a:t>
+              <a:t>22.06.2020</a:t>
             </a:fld>
             <a:endParaRPr lang="ru-RU"/>
           </a:p>
@@ -1358,7 +1359,7 @@
           <a:p>
             <a:fld id="{8EE317FE-38B4-4091-87DA-9B30919F7668}" type="datetime1">
               <a:rPr lang="ru-RU" smtClean="0"/>
-              <a:t>21.06.2020</a:t>
+              <a:t>22.06.2020</a:t>
             </a:fld>
             <a:endParaRPr lang="ru-RU"/>
           </a:p>
@@ -1705,7 +1706,7 @@
           <a:p>
             <a:fld id="{3DC0A1BC-914A-449F-8D5E-D20847D9368C}" type="datetime1">
               <a:rPr lang="ru-RU" smtClean="0"/>
-              <a:t>21.06.2020</a:t>
+              <a:t>22.06.2020</a:t>
             </a:fld>
             <a:endParaRPr lang="ru-RU"/>
           </a:p>
@@ -1984,7 +1985,7 @@
           <a:p>
             <a:fld id="{A4E6A2AE-A80A-4DD5-B261-C4BF1FFC804F}" type="datetime1">
               <a:rPr lang="ru-RU" smtClean="0"/>
-              <a:t>21.06.2020</a:t>
+              <a:t>22.06.2020</a:t>
             </a:fld>
             <a:endParaRPr lang="ru-RU"/>
           </a:p>
@@ -2367,7 +2368,7 @@
           <a:p>
             <a:fld id="{37A5419F-938C-46BD-A23F-5718BFB889FF}" type="datetime1">
               <a:rPr lang="ru-RU" smtClean="0"/>
-              <a:t>21.06.2020</a:t>
+              <a:t>22.06.2020</a:t>
             </a:fld>
             <a:endParaRPr lang="ru-RU"/>
           </a:p>
@@ -2489,7 +2490,7 @@
           <a:p>
             <a:fld id="{9F4B203A-55BD-4275-910B-7B6EE370E5D0}" type="datetime1">
               <a:rPr lang="ru-RU" smtClean="0"/>
-              <a:t>21.06.2020</a:t>
+              <a:t>22.06.2020</a:t>
             </a:fld>
             <a:endParaRPr lang="ru-RU"/>
           </a:p>
@@ -2664,7 +2665,7 @@
           <a:p>
             <a:fld id="{B878FCE0-9EB3-4E60-B337-6B23D2FFC9BB}" type="datetime1">
               <a:rPr lang="ru-RU" smtClean="0"/>
-              <a:t>21.06.2020</a:t>
+              <a:t>22.06.2020</a:t>
             </a:fld>
             <a:endParaRPr lang="ru-RU"/>
           </a:p>
@@ -3022,7 +3023,7 @@
           <a:p>
             <a:fld id="{88EAEB63-16F8-4952-82B8-B0045F148F62}" type="datetime1">
               <a:rPr lang="ru-RU" smtClean="0"/>
-              <a:t>21.06.2020</a:t>
+              <a:t>22.06.2020</a:t>
             </a:fld>
             <a:endParaRPr lang="ru-RU"/>
           </a:p>
@@ -3408,7 +3409,7 @@
           <a:p>
             <a:fld id="{154B5700-4FCA-472A-A04F-DDF1CFA62EE9}" type="datetime1">
               <a:rPr lang="ru-RU" smtClean="0"/>
-              <a:t>21.06.2020</a:t>
+              <a:t>22.06.2020</a:t>
             </a:fld>
             <a:endParaRPr lang="ru-RU"/>
           </a:p>
@@ -3699,7 +3700,7 @@
           <a:p>
             <a:fld id="{51B60F0E-6BAE-4C1E-A5C5-EA41B093EABD}" type="datetime1">
               <a:rPr lang="ru-RU" smtClean="0"/>
-              <a:t>21.06.2020</a:t>
+              <a:t>22.06.2020</a:t>
             </a:fld>
             <a:endParaRPr lang="ru-RU"/>
           </a:p>
@@ -4613,603 +4614,14 @@
           <a:p>
             <a:r>
               <a:rPr lang="ru-RU" dirty="0" smtClean="0"/>
-              <a:t>Применение шифров для отражения угроз</a:t>
+              <a:t>Методика апробации методологии</a:t>
             </a:r>
             <a:endParaRPr lang="ru-RU" dirty="0"/>
           </a:p>
         </p:txBody>
       </p:sp>
-      <p:sp>
-        <p:nvSpPr>
-          <p:cNvPr id="3" name="Объект 2"/>
-          <p:cNvSpPr>
-            <a:spLocks noGrp="1"/>
-          </p:cNvSpPr>
-          <p:nvPr>
-            <p:ph idx="1"/>
-          </p:nvPr>
-        </p:nvSpPr>
-        <p:spPr>
-          <a:xfrm>
-            <a:off x="1097279" y="1845734"/>
-            <a:ext cx="10826403" cy="4259502"/>
-          </a:xfrm>
-        </p:spPr>
-        <p:txBody>
-          <a:bodyPr>
-            <a:normAutofit lnSpcReduction="10000"/>
-          </a:bodyPr>
-          <a:lstStyle/>
-          <a:p>
-            <a:pPr>
-              <a:buFont typeface="Wingdings" panose="05000000000000000000" pitchFamily="2" charset="2"/>
-              <a:buChar char="q"/>
-            </a:pPr>
-            <a:r>
-              <a:rPr lang="ru-RU" sz="2400" dirty="0" smtClean="0"/>
-              <a:t>Достоверность и целостность (аутентификация) –</a:t>
-            </a:r>
-            <a:endParaRPr lang="en-US" sz="2400" dirty="0" smtClean="0"/>
-          </a:p>
-          <a:p>
-            <a:pPr marL="0" indent="0">
-              <a:buNone/>
-            </a:pPr>
-            <a:r>
-              <a:rPr lang="ru-RU" sz="2400" dirty="0" err="1" smtClean="0"/>
-              <a:t>Неинтерактивность</a:t>
-            </a:r>
-            <a:r>
-              <a:rPr lang="ru-RU" sz="2400" dirty="0" smtClean="0"/>
-              <a:t> </a:t>
-            </a:r>
-            <a:r>
-              <a:rPr lang="en-US" sz="2400" dirty="0" smtClean="0"/>
-              <a:t>=&gt; </a:t>
-            </a:r>
-            <a:r>
-              <a:rPr lang="ru-RU" sz="2400" dirty="0" err="1" smtClean="0"/>
-              <a:t>хэш</a:t>
-            </a:r>
-            <a:r>
-              <a:rPr lang="ru-RU" sz="2400" dirty="0" smtClean="0"/>
-              <a:t> + цифровая подпись</a:t>
-            </a:r>
-          </a:p>
-          <a:p>
-            <a:pPr>
-              <a:buFont typeface="Wingdings" panose="05000000000000000000" pitchFamily="2" charset="2"/>
-              <a:buChar char="q"/>
-            </a:pPr>
-            <a:r>
-              <a:rPr lang="ru-RU" sz="2400" dirty="0"/>
-              <a:t> </a:t>
-            </a:r>
-            <a:r>
-              <a:rPr lang="ru-RU" sz="2400" dirty="0" smtClean="0"/>
-              <a:t>Подлинность – метка времени</a:t>
-            </a:r>
-          </a:p>
-          <a:p>
-            <a:pPr>
-              <a:buFont typeface="Wingdings" panose="05000000000000000000" pitchFamily="2" charset="2"/>
-              <a:buChar char="q"/>
-            </a:pPr>
-            <a:r>
-              <a:rPr lang="ru-RU" sz="2400" dirty="0"/>
-              <a:t> Конфиденциальность </a:t>
-            </a:r>
-            <a:endParaRPr lang="ru-RU" sz="2400" dirty="0" smtClean="0"/>
-          </a:p>
-          <a:p>
-            <a:pPr lvl="1">
-              <a:buFont typeface="Wingdings" panose="05000000000000000000" pitchFamily="2" charset="2"/>
-              <a:buChar char="q"/>
-            </a:pPr>
-            <a:r>
-              <a:rPr lang="ru-RU" sz="2200" dirty="0"/>
-              <a:t> </a:t>
-            </a:r>
-            <a:r>
-              <a:rPr lang="ru-RU" sz="2200" dirty="0" smtClean="0"/>
-              <a:t>Блочное шифры </a:t>
-            </a:r>
-            <a:r>
-              <a:rPr lang="en-US" sz="2400" dirty="0" smtClean="0"/>
-              <a:t>&gt; </a:t>
-            </a:r>
-            <a:r>
-              <a:rPr lang="ru-RU" sz="2400" dirty="0" smtClean="0"/>
-              <a:t>Потоковые шифры </a:t>
-            </a:r>
-            <a:r>
-              <a:rPr lang="en-US" sz="2400" dirty="0" smtClean="0"/>
-              <a:t>&gt; </a:t>
-            </a:r>
-            <a:r>
-              <a:rPr lang="ru-RU" sz="2400" dirty="0" smtClean="0"/>
-              <a:t>Асимметричные шифры</a:t>
-            </a:r>
-          </a:p>
-          <a:p>
-            <a:pPr lvl="1">
-              <a:buFont typeface="Wingdings" panose="05000000000000000000" pitchFamily="2" charset="2"/>
-              <a:buChar char="q"/>
-            </a:pPr>
-            <a:r>
-              <a:rPr lang="ru-RU" sz="2400" dirty="0"/>
-              <a:t> </a:t>
-            </a:r>
-            <a:r>
-              <a:rPr lang="ru-RU" sz="2400" dirty="0" smtClean="0"/>
-              <a:t>Ключевые недостатки потоковых – долгая инициализация и большое потребление памяти</a:t>
-            </a:r>
-          </a:p>
-          <a:p>
-            <a:pPr lvl="1">
-              <a:buFont typeface="Wingdings" panose="05000000000000000000" pitchFamily="2" charset="2"/>
-              <a:buChar char="q"/>
-            </a:pPr>
-            <a:r>
-              <a:rPr lang="ru-RU" sz="2400" dirty="0"/>
-              <a:t> </a:t>
-            </a:r>
-            <a:r>
-              <a:rPr lang="ru-RU" sz="2400" dirty="0" smtClean="0"/>
-              <a:t>Ключевые недостатки асимметричных – б</a:t>
-            </a:r>
-            <a:r>
-              <a:rPr lang="en-US" sz="2400" dirty="0" smtClean="0"/>
-              <a:t>ó</a:t>
-            </a:r>
-            <a:r>
-              <a:rPr lang="ru-RU" sz="2400" dirty="0" err="1" smtClean="0"/>
-              <a:t>льшая</a:t>
-            </a:r>
-            <a:r>
-              <a:rPr lang="ru-RU" sz="2400" dirty="0" smtClean="0"/>
-              <a:t> длина ключа, большее время шифрования (</a:t>
-            </a:r>
-            <a:r>
-              <a:rPr lang="ru-RU" sz="2400" dirty="0" err="1" smtClean="0"/>
-              <a:t>неисп</a:t>
-            </a:r>
-            <a:r>
-              <a:rPr lang="ru-RU" sz="2400" dirty="0" smtClean="0"/>
-              <a:t>. Преим. </a:t>
-            </a:r>
-            <a:r>
-              <a:rPr lang="ru-RU" sz="2400" dirty="0"/>
-              <a:t>- нет необходимости передачи секретного ключа, ключ дешифрования может хранить только одна </a:t>
-            </a:r>
-            <a:r>
-              <a:rPr lang="ru-RU" sz="2400" dirty="0" smtClean="0"/>
-              <a:t>сторона – для аутентификации)</a:t>
-            </a:r>
-            <a:endParaRPr lang="ru-RU" sz="2200" dirty="0"/>
-          </a:p>
-        </p:txBody>
-      </p:sp>
-      <p:sp>
-        <p:nvSpPr>
-          <p:cNvPr id="4" name="Нижний колонтитул 3"/>
-          <p:cNvSpPr>
-            <a:spLocks noGrp="1"/>
-          </p:cNvSpPr>
-          <p:nvPr>
-            <p:ph type="ftr" sz="quarter" idx="11"/>
-          </p:nvPr>
-        </p:nvSpPr>
-        <p:spPr>
-          <a:xfrm>
-            <a:off x="0" y="6410036"/>
-            <a:ext cx="12302836" cy="447964"/>
-          </a:xfrm>
-        </p:spPr>
-        <p:txBody>
-          <a:bodyPr/>
-          <a:lstStyle/>
-          <a:p>
-            <a:r>
-              <a:rPr lang="ru-RU" sz="2000" dirty="0" smtClean="0"/>
-              <a:t>СРАВНИТЕЛЬНЫЙ АНАЛИЗ АЛГОРИТМОВ ЛЕГКОВЕСНОЙ КРИПТОГРАФИИ ДЛЯ УСТРОЙСТВ ИНТЕРНЕТА </a:t>
-            </a:r>
-            <a:r>
-              <a:rPr lang="ru-RU" sz="2000" dirty="0" err="1" smtClean="0"/>
-              <a:t>ВЕЩЕй</a:t>
-            </a:r>
-            <a:endParaRPr lang="ru-RU" sz="2000" dirty="0"/>
-          </a:p>
-        </p:txBody>
-      </p:sp>
-      <p:sp>
-        <p:nvSpPr>
-          <p:cNvPr id="7" name="Номер слайда 6"/>
-          <p:cNvSpPr>
-            <a:spLocks noGrp="1"/>
-          </p:cNvSpPr>
-          <p:nvPr>
-            <p:ph type="sldNum" sz="quarter" idx="12"/>
-          </p:nvPr>
-        </p:nvSpPr>
-        <p:spPr>
-          <a:xfrm>
-            <a:off x="10611658" y="516948"/>
-            <a:ext cx="1312025" cy="365125"/>
-          </a:xfrm>
-        </p:spPr>
-        <p:txBody>
-          <a:bodyPr/>
-          <a:lstStyle/>
-          <a:p>
-            <a:fld id="{C8E71B65-08E1-4CE1-BD4B-D1F08213E75D}" type="slidenum">
-              <a:rPr lang="ru-RU" sz="3600" smtClean="0">
-                <a:solidFill>
-                  <a:schemeClr val="tx1"/>
-                </a:solidFill>
-              </a:rPr>
-              <a:t>10</a:t>
-            </a:fld>
-            <a:endParaRPr lang="ru-RU" sz="2400" dirty="0">
-              <a:solidFill>
-                <a:schemeClr val="tx1"/>
-              </a:solidFill>
-            </a:endParaRPr>
-          </a:p>
-        </p:txBody>
-      </p:sp>
-    </p:spTree>
-    <p:extLst>
-      <p:ext uri="{BB962C8B-B14F-4D97-AF65-F5344CB8AC3E}">
-        <p14:creationId xmlns:p14="http://schemas.microsoft.com/office/powerpoint/2010/main" val="4003392376"/>
-      </p:ext>
-    </p:extLst>
-  </p:cSld>
-  <p:clrMapOvr>
-    <a:masterClrMapping/>
-  </p:clrMapOvr>
-  <p:timing>
-    <p:tnLst>
-      <p:par>
-        <p:cTn id="1" dur="indefinite" restart="never" nodeType="tmRoot"/>
-      </p:par>
-    </p:tnLst>
-  </p:timing>
-</p:sld>
-</file>
-
-<file path=ppt/slides/slide11.xml><?xml version="1.0" encoding="utf-8"?>
-<p:sld xmlns:a="http://schemas.openxmlformats.org/drawingml/2006/main" xmlns:r="http://schemas.openxmlformats.org/officeDocument/2006/relationships" xmlns:p="http://schemas.openxmlformats.org/presentationml/2006/main">
-  <p:cSld>
-    <p:spTree>
-      <p:nvGrpSpPr>
-        <p:cNvPr id="1" name=""/>
-        <p:cNvGrpSpPr/>
-        <p:nvPr/>
-      </p:nvGrpSpPr>
-      <p:grpSpPr>
-        <a:xfrm>
-          <a:off x="0" y="0"/>
-          <a:ext cx="0" cy="0"/>
-          <a:chOff x="0" y="0"/>
-          <a:chExt cx="0" cy="0"/>
-        </a:xfrm>
-      </p:grpSpPr>
-      <p:sp>
-        <p:nvSpPr>
-          <p:cNvPr id="2" name="Заголовок 1"/>
-          <p:cNvSpPr>
-            <a:spLocks noGrp="1"/>
-          </p:cNvSpPr>
-          <p:nvPr>
-            <p:ph type="title"/>
-          </p:nvPr>
-        </p:nvSpPr>
-        <p:spPr/>
-        <p:txBody>
-          <a:bodyPr/>
-          <a:lstStyle/>
-          <a:p>
-            <a:r>
-              <a:rPr lang="ru-RU" dirty="0" smtClean="0"/>
-              <a:t>Методология тестирования реализаций шифров</a:t>
-            </a:r>
-            <a:endParaRPr lang="ru-RU" dirty="0"/>
-          </a:p>
-        </p:txBody>
-      </p:sp>
-      <p:sp>
-        <p:nvSpPr>
-          <p:cNvPr id="3" name="Объект 2"/>
-          <p:cNvSpPr>
-            <a:spLocks noGrp="1"/>
-          </p:cNvSpPr>
-          <p:nvPr>
-            <p:ph idx="1"/>
-          </p:nvPr>
-        </p:nvSpPr>
-        <p:spPr>
-          <a:xfrm>
-            <a:off x="1097279" y="1845734"/>
-            <a:ext cx="10826403" cy="4259502"/>
-          </a:xfrm>
-        </p:spPr>
-        <p:txBody>
-          <a:bodyPr>
-            <a:normAutofit/>
-          </a:bodyPr>
-          <a:lstStyle/>
-          <a:p>
-            <a:pPr>
-              <a:buFont typeface="Wingdings" panose="05000000000000000000" pitchFamily="2" charset="2"/>
-              <a:buChar char="q"/>
-            </a:pPr>
-            <a:r>
-              <a:rPr lang="ru-RU" sz="2200" dirty="0" smtClean="0"/>
-              <a:t> Производительность = задержка + пропускная способность</a:t>
-            </a:r>
-          </a:p>
-          <a:p>
-            <a:pPr>
-              <a:buFont typeface="Wingdings" panose="05000000000000000000" pitchFamily="2" charset="2"/>
-              <a:buChar char="q"/>
-            </a:pPr>
-            <a:r>
-              <a:rPr lang="ru-RU" sz="2200" dirty="0"/>
-              <a:t> </a:t>
-            </a:r>
-            <a:r>
-              <a:rPr lang="ru-RU" sz="2200" dirty="0" smtClean="0"/>
-              <a:t>Мощность энергопотребления (Ватт)</a:t>
-            </a:r>
-            <a:endParaRPr lang="ru-RU" sz="2200" dirty="0"/>
-          </a:p>
-          <a:p>
-            <a:pPr>
-              <a:buFont typeface="Wingdings" panose="05000000000000000000" pitchFamily="2" charset="2"/>
-              <a:buChar char="q"/>
-            </a:pPr>
-            <a:r>
-              <a:rPr lang="ru-RU" sz="2200" dirty="0" smtClean="0"/>
-              <a:t> Достоинства:</a:t>
-            </a:r>
-          </a:p>
-          <a:p>
-            <a:pPr lvl="1">
-              <a:buFont typeface="Wingdings" panose="05000000000000000000" pitchFamily="2" charset="2"/>
-              <a:buChar char="q"/>
-            </a:pPr>
-            <a:r>
-              <a:rPr lang="ru-RU" sz="2000" dirty="0"/>
-              <a:t> </a:t>
-            </a:r>
-            <a:r>
-              <a:rPr lang="ru-RU" sz="2000" dirty="0" smtClean="0"/>
-              <a:t>Подходит для ПК, не требует серьезного оборудования</a:t>
-            </a:r>
-          </a:p>
-          <a:p>
-            <a:pPr lvl="1">
-              <a:buFont typeface="Wingdings" panose="05000000000000000000" pitchFamily="2" charset="2"/>
-              <a:buChar char="q"/>
-            </a:pPr>
-            <a:r>
-              <a:rPr lang="ru-RU" sz="2000" dirty="0"/>
-              <a:t> </a:t>
-            </a:r>
-            <a:r>
-              <a:rPr lang="ru-RU" sz="2000" dirty="0" smtClean="0"/>
-              <a:t>Позволяет добиться достаточно низкой погрешности</a:t>
-            </a:r>
-          </a:p>
-          <a:p>
-            <a:pPr lvl="1">
-              <a:buFont typeface="Wingdings" panose="05000000000000000000" pitchFamily="2" charset="2"/>
-              <a:buChar char="q"/>
-            </a:pPr>
-            <a:r>
-              <a:rPr lang="ru-RU" sz="2000" dirty="0"/>
-              <a:t> </a:t>
-            </a:r>
-            <a:r>
-              <a:rPr lang="ru-RU" sz="2000" dirty="0" smtClean="0"/>
-              <a:t>Робастность (далее)</a:t>
-            </a:r>
-          </a:p>
-          <a:p>
-            <a:pPr lvl="1">
-              <a:buFont typeface="Wingdings" panose="05000000000000000000" pitchFamily="2" charset="2"/>
-              <a:buChar char="q"/>
-            </a:pPr>
-            <a:r>
-              <a:rPr lang="ru-RU" sz="2000" dirty="0"/>
-              <a:t> </a:t>
-            </a:r>
-            <a:r>
-              <a:rPr lang="ru-RU" sz="2000" dirty="0" smtClean="0"/>
-              <a:t>На исследованном участке – устойчивость к изменению диапазона (далее)</a:t>
-            </a:r>
-            <a:endParaRPr lang="ru-RU" sz="2000" dirty="0"/>
-          </a:p>
-          <a:p>
-            <a:pPr>
-              <a:buFont typeface="Wingdings" panose="05000000000000000000" pitchFamily="2" charset="2"/>
-              <a:buChar char="q"/>
-            </a:pPr>
-            <a:r>
-              <a:rPr lang="ru-RU" sz="2200" dirty="0" smtClean="0"/>
-              <a:t> Недостатки:</a:t>
-            </a:r>
-          </a:p>
-          <a:p>
-            <a:pPr lvl="1">
-              <a:buFont typeface="Wingdings" panose="05000000000000000000" pitchFamily="2" charset="2"/>
-              <a:buChar char="q"/>
-            </a:pPr>
-            <a:r>
-              <a:rPr lang="ru-RU" sz="2000" dirty="0"/>
-              <a:t> </a:t>
-            </a:r>
-            <a:r>
-              <a:rPr lang="ru-RU" sz="2000" dirty="0" smtClean="0"/>
-              <a:t>Отсутствие самодостаточности (сначала – </a:t>
-            </a:r>
-            <a:r>
-              <a:rPr lang="ru-RU" sz="2000" dirty="0" err="1" smtClean="0"/>
-              <a:t>криптоанализ</a:t>
-            </a:r>
-            <a:r>
-              <a:rPr lang="ru-RU" sz="2000" dirty="0" smtClean="0"/>
-              <a:t>)</a:t>
-            </a:r>
-          </a:p>
-          <a:p>
-            <a:pPr lvl="1">
-              <a:buFont typeface="Wingdings" panose="05000000000000000000" pitchFamily="2" charset="2"/>
-              <a:buChar char="q"/>
-            </a:pPr>
-            <a:r>
-              <a:rPr lang="ru-RU" sz="2000" dirty="0"/>
-              <a:t> </a:t>
-            </a:r>
-            <a:r>
-              <a:rPr lang="ru-RU" sz="2000" dirty="0" smtClean="0"/>
-              <a:t>Требует известной аккуратности, ассемблерная реализация – достаточно трудоемкое дело</a:t>
-            </a:r>
-            <a:endParaRPr lang="ru-RU" sz="2000" dirty="0"/>
-          </a:p>
-        </p:txBody>
-      </p:sp>
-      <p:sp>
-        <p:nvSpPr>
-          <p:cNvPr id="4" name="Нижний колонтитул 3"/>
-          <p:cNvSpPr>
-            <a:spLocks noGrp="1"/>
-          </p:cNvSpPr>
-          <p:nvPr>
-            <p:ph type="ftr" sz="quarter" idx="11"/>
-          </p:nvPr>
-        </p:nvSpPr>
-        <p:spPr>
-          <a:xfrm>
-            <a:off x="0" y="6410036"/>
-            <a:ext cx="12302836" cy="447964"/>
-          </a:xfrm>
-        </p:spPr>
-        <p:txBody>
-          <a:bodyPr/>
-          <a:lstStyle/>
-          <a:p>
-            <a:r>
-              <a:rPr lang="ru-RU" sz="2000" dirty="0" smtClean="0"/>
-              <a:t>СРАВНИТЕЛЬНЫЙ АНАЛИЗ АЛГОРИТМОВ ЛЕГКОВЕСНОЙ КРИПТОГРАФИИ ДЛЯ УСТРОЙСТВ ИНТЕРНЕТА </a:t>
-            </a:r>
-            <a:r>
-              <a:rPr lang="ru-RU" sz="2000" dirty="0" err="1" smtClean="0"/>
-              <a:t>ВЕЩЕй</a:t>
-            </a:r>
-            <a:endParaRPr lang="ru-RU" sz="2000" dirty="0"/>
-          </a:p>
-        </p:txBody>
-      </p:sp>
-      <p:sp>
-        <p:nvSpPr>
-          <p:cNvPr id="7" name="Номер слайда 6"/>
-          <p:cNvSpPr>
-            <a:spLocks noGrp="1"/>
-          </p:cNvSpPr>
-          <p:nvPr>
-            <p:ph type="sldNum" sz="quarter" idx="12"/>
-          </p:nvPr>
-        </p:nvSpPr>
-        <p:spPr>
-          <a:xfrm>
-            <a:off x="10611658" y="516948"/>
-            <a:ext cx="1312025" cy="365125"/>
-          </a:xfrm>
-        </p:spPr>
-        <p:txBody>
-          <a:bodyPr/>
-          <a:lstStyle/>
-          <a:p>
-            <a:fld id="{C8E71B65-08E1-4CE1-BD4B-D1F08213E75D}" type="slidenum">
-              <a:rPr lang="ru-RU" sz="3600" smtClean="0">
-                <a:solidFill>
-                  <a:schemeClr val="tx1"/>
-                </a:solidFill>
-              </a:rPr>
-              <a:t>11</a:t>
-            </a:fld>
-            <a:endParaRPr lang="ru-RU" sz="2400" dirty="0">
-              <a:solidFill>
-                <a:schemeClr val="tx1"/>
-              </a:solidFill>
-            </a:endParaRPr>
-          </a:p>
-        </p:txBody>
-      </p:sp>
-    </p:spTree>
-    <p:extLst>
-      <p:ext uri="{BB962C8B-B14F-4D97-AF65-F5344CB8AC3E}">
-        <p14:creationId xmlns:p14="http://schemas.microsoft.com/office/powerpoint/2010/main" val="1689523132"/>
-      </p:ext>
-    </p:extLst>
-  </p:cSld>
-  <p:clrMapOvr>
-    <a:masterClrMapping/>
-  </p:clrMapOvr>
-  <p:timing>
-    <p:tnLst>
-      <p:par>
-        <p:cTn id="1" dur="indefinite" restart="never" nodeType="tmRoot"/>
-      </p:par>
-    </p:tnLst>
-  </p:timing>
-</p:sld>
-</file>
-
-<file path=ppt/slides/slide12.xml><?xml version="1.0" encoding="utf-8"?>
-<p:sld xmlns:a="http://schemas.openxmlformats.org/drawingml/2006/main" xmlns:r="http://schemas.openxmlformats.org/officeDocument/2006/relationships" xmlns:p="http://schemas.openxmlformats.org/presentationml/2006/main">
-  <p:cSld>
-    <p:spTree>
-      <p:nvGrpSpPr>
-        <p:cNvPr id="1" name=""/>
-        <p:cNvGrpSpPr/>
-        <p:nvPr/>
-      </p:nvGrpSpPr>
-      <p:grpSpPr>
-        <a:xfrm>
-          <a:off x="0" y="0"/>
-          <a:ext cx="0" cy="0"/>
-          <a:chOff x="0" y="0"/>
-          <a:chExt cx="0" cy="0"/>
-        </a:xfrm>
-      </p:grpSpPr>
-      <p:sp>
-        <p:nvSpPr>
-          <p:cNvPr id="2" name="Заголовок 1"/>
-          <p:cNvSpPr>
-            <a:spLocks noGrp="1"/>
-          </p:cNvSpPr>
-          <p:nvPr>
-            <p:ph type="title"/>
-          </p:nvPr>
-        </p:nvSpPr>
-        <p:spPr/>
-        <p:txBody>
-          <a:bodyPr/>
-          <a:lstStyle/>
-          <a:p>
-            <a:r>
-              <a:rPr lang="ru-RU" dirty="0" smtClean="0"/>
-              <a:t>Методика апробации методологии</a:t>
-            </a:r>
-            <a:endParaRPr lang="ru-RU" dirty="0"/>
-          </a:p>
-        </p:txBody>
-      </p:sp>
-      <mc:AlternateContent xmlns:mc="http://schemas.openxmlformats.org/markup-compatibility/2006" xmlns:a14="http://schemas.microsoft.com/office/drawing/2010/main">
-        <mc:Choice Requires="a14">
+      <mc:AlternateContent xmlns:mc="http://schemas.openxmlformats.org/markup-compatibility/2006">
+        <mc:Choice xmlns:a14="http://schemas.microsoft.com/office/drawing/2010/main" Requires="a14">
           <p:sp>
             <p:nvSpPr>
               <p:cNvPr id="3" name="Объект 2"/>
@@ -5228,7 +4640,7 @@
             </p:spPr>
             <p:txBody>
               <a:bodyPr>
-                <a:normAutofit fontScale="92500" lnSpcReduction="20000"/>
+                <a:normAutofit lnSpcReduction="10000"/>
               </a:bodyPr>
               <a:lstStyle/>
               <a:p>
@@ -5247,26 +4659,26 @@
                 <a:endParaRPr lang="ru-RU" sz="2200" dirty="0" smtClean="0"/>
               </a:p>
               <a:p>
-                <a:pPr>
+                <a:pPr lvl="1">
                   <a:buFont typeface="Wingdings" panose="05000000000000000000" pitchFamily="2" charset="2"/>
                   <a:buChar char="q"/>
                 </a:pPr>
                 <a:r>
-                  <a:rPr lang="ru-RU" sz="2200" dirty="0"/>
+                  <a:rPr lang="ru-RU" dirty="0"/>
                   <a:t> </a:t>
                 </a:r>
                 <a:r>
-                  <a:rPr lang="ru-RU" sz="2200" dirty="0" smtClean="0"/>
+                  <a:rPr lang="ru-RU" dirty="0" smtClean="0"/>
                   <a:t>Для каждой реализации производится</a:t>
                 </a:r>
                 <a:r>
-                  <a:rPr lang="en-US" sz="2200" dirty="0" smtClean="0"/>
+                  <a:rPr lang="en-US" dirty="0" smtClean="0"/>
                   <a:t> </a:t>
                 </a:r>
                 <a14:m>
                   <m:oMath xmlns:m="http://schemas.openxmlformats.org/officeDocument/2006/math">
                     <m:r>
-                      <a:rPr lang="en-US" sz="2200" b="0" i="1" smtClean="0">
+                      <a:rPr lang="en-US" b="0" i="1" smtClean="0">
                         <a:latin typeface="Cambria Math" panose="02040503050406030204" pitchFamily="18" charset="0"/>
                       </a:rPr>
                       <m:t>𝑛</m:t>
@@ -5274,21 +4686,21 @@
                   </m:oMath>
                 </a14:m>
                 <a:r>
-                  <a:rPr lang="en-US" sz="2200" dirty="0" smtClean="0"/>
+                  <a:rPr lang="en-US" dirty="0" smtClean="0"/>
                   <a:t> </a:t>
                 </a:r>
                 <a:r>
-                  <a:rPr lang="ru-RU" sz="2200" dirty="0" smtClean="0"/>
+                  <a:rPr lang="ru-RU" dirty="0" smtClean="0"/>
                   <a:t>серий измерений для разных объемов входа </a:t>
                 </a:r>
                 <a:r>
-                  <a:rPr lang="en-US" sz="2200" dirty="0" smtClean="0"/>
+                  <a:rPr lang="en-US" dirty="0" smtClean="0"/>
                   <a:t>=&gt; </a:t>
                 </a:r>
                 <a14:m>
                   <m:oMath xmlns:m="http://schemas.openxmlformats.org/officeDocument/2006/math">
                     <m:r>
-                      <a:rPr lang="en-US" sz="2200" b="0" i="1" smtClean="0">
+                      <a:rPr lang="en-US" b="0" i="1" smtClean="0">
                         <a:latin typeface="Cambria Math" panose="02040503050406030204" pitchFamily="18" charset="0"/>
                       </a:rPr>
                       <m:t>𝑛</m:t>
@@ -5296,29 +4708,29 @@
                   </m:oMath>
                 </a14:m>
                 <a:r>
-                  <a:rPr lang="ru-RU" sz="2200" dirty="0" smtClean="0"/>
+                  <a:rPr lang="ru-RU" dirty="0" smtClean="0"/>
                   <a:t> </a:t>
                 </a:r>
                 <a:r>
-                  <a:rPr lang="ru-RU" sz="2200" dirty="0" err="1" smtClean="0"/>
+                  <a:rPr lang="ru-RU" dirty="0" err="1" smtClean="0"/>
                   <a:t>временнЫх</a:t>
                 </a:r>
                 <a:r>
-                  <a:rPr lang="ru-RU" sz="2200" dirty="0" smtClean="0"/>
+                  <a:rPr lang="ru-RU" dirty="0" smtClean="0"/>
                   <a:t> рядов</a:t>
                 </a:r>
               </a:p>
               <a:p>
-                <a:pPr>
+                <a:pPr lvl="1">
                   <a:buFont typeface="Wingdings" panose="05000000000000000000" pitchFamily="2" charset="2"/>
                   <a:buChar char="q"/>
                 </a:pPr>
                 <a:r>
-                  <a:rPr lang="ru-RU" sz="2200" dirty="0"/>
+                  <a:rPr lang="ru-RU" dirty="0"/>
                   <a:t> </a:t>
                 </a:r>
                 <a:r>
-                  <a:rPr lang="ru-RU" sz="2200" dirty="0" smtClean="0"/>
+                  <a:rPr lang="ru-RU" dirty="0" smtClean="0"/>
                   <a:t>Каждое измерение делается на нескольких итерациях для уменьшения погрешности, время суммируется</a:t>
                 </a:r>
               </a:p>
@@ -5558,7 +4970,7 @@
             </p:txBody>
           </p:sp>
         </mc:Choice>
-        <mc:Fallback xmlns="">
+        <mc:Fallback>
           <p:sp>
             <p:nvSpPr>
               <p:cNvPr id="3" name="Объект 2"/>
@@ -5577,7 +4989,7 @@
               <a:blipFill>
                 <a:blip r:embed="rId2"/>
                 <a:stretch>
-                  <a:fillRect l="-1351" t="-2718"/>
+                  <a:fillRect l="-1464" t="-2432" r="-1295"/>
                 </a:stretch>
               </a:blipFill>
             </p:spPr>
@@ -5654,7 +5066,7 @@
                   <a:schemeClr val="tx1"/>
                 </a:solidFill>
               </a:rPr>
-              <a:t>12</a:t>
+              <a:t>10</a:t>
             </a:fld>
             <a:endParaRPr lang="ru-RU" sz="2400" dirty="0">
               <a:solidFill>
@@ -5684,7 +5096,7 @@
 </p:sld>
 </file>
 
-<file path=ppt/slides/slide13.xml><?xml version="1.0" encoding="utf-8"?>
+<file path=ppt/slides/slide11.xml><?xml version="1.0" encoding="utf-8"?>
 <p:sld xmlns:a="http://schemas.openxmlformats.org/drawingml/2006/main" xmlns:r="http://schemas.openxmlformats.org/officeDocument/2006/relationships" xmlns:p="http://schemas.openxmlformats.org/presentationml/2006/main">
   <p:cSld>
     <p:spTree>
@@ -5894,7 +5306,7 @@
                   <a:schemeClr val="tx1"/>
                 </a:solidFill>
               </a:rPr>
-              <a:t>13</a:t>
+              <a:t>11</a:t>
             </a:fld>
             <a:endParaRPr lang="ru-RU" sz="2400" dirty="0">
               <a:solidFill>
@@ -6626,6 +6038,392 @@
 </p:sld>
 </file>
 
+<file path=ppt/slides/slide12.xml><?xml version="1.0" encoding="utf-8"?>
+<p:sld xmlns:a="http://schemas.openxmlformats.org/drawingml/2006/main" xmlns:r="http://schemas.openxmlformats.org/officeDocument/2006/relationships" xmlns:p="http://schemas.openxmlformats.org/presentationml/2006/main">
+  <p:cSld>
+    <p:spTree>
+      <p:nvGrpSpPr>
+        <p:cNvPr id="1" name=""/>
+        <p:cNvGrpSpPr/>
+        <p:nvPr/>
+      </p:nvGrpSpPr>
+      <p:grpSpPr>
+        <a:xfrm>
+          <a:off x="0" y="0"/>
+          <a:ext cx="0" cy="0"/>
+          <a:chOff x="0" y="0"/>
+          <a:chExt cx="0" cy="0"/>
+        </a:xfrm>
+      </p:grpSpPr>
+      <p:sp>
+        <p:nvSpPr>
+          <p:cNvPr id="2" name="Заголовок 1"/>
+          <p:cNvSpPr>
+            <a:spLocks noGrp="1"/>
+          </p:cNvSpPr>
+          <p:nvPr>
+            <p:ph type="title"/>
+          </p:nvPr>
+        </p:nvSpPr>
+        <p:spPr/>
+        <p:txBody>
+          <a:bodyPr/>
+          <a:lstStyle/>
+          <a:p>
+            <a:r>
+              <a:rPr lang="ru-RU" dirty="0" smtClean="0"/>
+              <a:t>Результаты первого измерения (1)</a:t>
+            </a:r>
+            <a:endParaRPr lang="ru-RU" dirty="0"/>
+          </a:p>
+        </p:txBody>
+      </p:sp>
+      <p:sp>
+        <p:nvSpPr>
+          <p:cNvPr id="3" name="Объект 2"/>
+          <p:cNvSpPr>
+            <a:spLocks noGrp="1"/>
+          </p:cNvSpPr>
+          <p:nvPr>
+            <p:ph idx="1"/>
+          </p:nvPr>
+        </p:nvSpPr>
+        <p:spPr>
+          <a:xfrm>
+            <a:off x="1097279" y="1845734"/>
+            <a:ext cx="10826403" cy="4259502"/>
+          </a:xfrm>
+        </p:spPr>
+        <p:txBody>
+          <a:bodyPr>
+            <a:normAutofit/>
+          </a:bodyPr>
+          <a:lstStyle/>
+          <a:p>
+            <a:pPr>
+              <a:buFont typeface="Wingdings" panose="05000000000000000000" pitchFamily="2" charset="2"/>
+              <a:buChar char="q"/>
+            </a:pPr>
+            <a:r>
+              <a:rPr lang="ru-RU" sz="2200" dirty="0" smtClean="0"/>
+              <a:t> </a:t>
+            </a:r>
+            <a:endParaRPr lang="ru-RU" sz="2200" dirty="0"/>
+          </a:p>
+        </p:txBody>
+      </p:sp>
+      <p:sp>
+        <p:nvSpPr>
+          <p:cNvPr id="4" name="Нижний колонтитул 3"/>
+          <p:cNvSpPr>
+            <a:spLocks noGrp="1"/>
+          </p:cNvSpPr>
+          <p:nvPr>
+            <p:ph type="ftr" sz="quarter" idx="11"/>
+          </p:nvPr>
+        </p:nvSpPr>
+        <p:spPr>
+          <a:xfrm>
+            <a:off x="0" y="6410036"/>
+            <a:ext cx="12302836" cy="447964"/>
+          </a:xfrm>
+        </p:spPr>
+        <p:txBody>
+          <a:bodyPr/>
+          <a:lstStyle/>
+          <a:p>
+            <a:r>
+              <a:rPr lang="ru-RU" sz="2000" dirty="0" smtClean="0"/>
+              <a:t>СРАВНИТЕЛЬНЫЙ АНАЛИЗ АЛГОРИТМОВ ЛЕГКОВЕСНОЙ КРИПТОГРАФИИ ДЛЯ УСТРОЙСТВ ИНТЕРНЕТА </a:t>
+            </a:r>
+            <a:r>
+              <a:rPr lang="ru-RU" sz="2000" dirty="0" err="1" smtClean="0"/>
+              <a:t>ВЕЩЕй</a:t>
+            </a:r>
+            <a:endParaRPr lang="ru-RU" sz="2000" dirty="0"/>
+          </a:p>
+        </p:txBody>
+      </p:sp>
+      <p:sp>
+        <p:nvSpPr>
+          <p:cNvPr id="7" name="Номер слайда 6"/>
+          <p:cNvSpPr>
+            <a:spLocks noGrp="1"/>
+          </p:cNvSpPr>
+          <p:nvPr>
+            <p:ph type="sldNum" sz="quarter" idx="12"/>
+          </p:nvPr>
+        </p:nvSpPr>
+        <p:spPr>
+          <a:xfrm>
+            <a:off x="10611658" y="516948"/>
+            <a:ext cx="1312025" cy="365125"/>
+          </a:xfrm>
+        </p:spPr>
+        <p:txBody>
+          <a:bodyPr/>
+          <a:lstStyle/>
+          <a:p>
+            <a:fld id="{C8E71B65-08E1-4CE1-BD4B-D1F08213E75D}" type="slidenum">
+              <a:rPr lang="ru-RU" sz="3600" smtClean="0">
+                <a:solidFill>
+                  <a:schemeClr val="tx1"/>
+                </a:solidFill>
+              </a:rPr>
+              <a:t>12</a:t>
+            </a:fld>
+            <a:endParaRPr lang="ru-RU" sz="2400" dirty="0">
+              <a:solidFill>
+                <a:schemeClr val="tx1"/>
+              </a:solidFill>
+            </a:endParaRPr>
+          </a:p>
+        </p:txBody>
+      </p:sp>
+      <p:pic>
+        <p:nvPicPr>
+          <p:cNvPr id="5" name="Рисунок 4"/>
+          <p:cNvPicPr>
+            <a:picLocks noChangeAspect="1"/>
+          </p:cNvPicPr>
+          <p:nvPr/>
+        </p:nvPicPr>
+        <p:blipFill>
+          <a:blip r:embed="rId2"/>
+          <a:stretch>
+            <a:fillRect/>
+          </a:stretch>
+        </p:blipFill>
+        <p:spPr>
+          <a:xfrm>
+            <a:off x="605238" y="1787236"/>
+            <a:ext cx="5521242" cy="4076432"/>
+          </a:xfrm>
+          <a:prstGeom prst="rect">
+            <a:avLst/>
+          </a:prstGeom>
+        </p:spPr>
+      </p:pic>
+      <p:pic>
+        <p:nvPicPr>
+          <p:cNvPr id="8" name="Рисунок 7"/>
+          <p:cNvPicPr>
+            <a:picLocks noChangeAspect="1"/>
+          </p:cNvPicPr>
+          <p:nvPr/>
+        </p:nvPicPr>
+        <p:blipFill>
+          <a:blip r:embed="rId3"/>
+          <a:stretch>
+            <a:fillRect/>
+          </a:stretch>
+        </p:blipFill>
+        <p:spPr>
+          <a:xfrm>
+            <a:off x="6126480" y="1737360"/>
+            <a:ext cx="5637168" cy="4169958"/>
+          </a:xfrm>
+          <a:prstGeom prst="rect">
+            <a:avLst/>
+          </a:prstGeom>
+        </p:spPr>
+      </p:pic>
+    </p:spTree>
+    <p:extLst>
+      <p:ext uri="{BB962C8B-B14F-4D97-AF65-F5344CB8AC3E}">
+        <p14:creationId xmlns:p14="http://schemas.microsoft.com/office/powerpoint/2010/main" val="2021568438"/>
+      </p:ext>
+    </p:extLst>
+  </p:cSld>
+  <p:clrMapOvr>
+    <a:masterClrMapping/>
+  </p:clrMapOvr>
+  <p:timing>
+    <p:tnLst>
+      <p:par>
+        <p:cTn id="1" dur="indefinite" restart="never" nodeType="tmRoot"/>
+      </p:par>
+    </p:tnLst>
+  </p:timing>
+</p:sld>
+</file>
+
+<file path=ppt/slides/slide13.xml><?xml version="1.0" encoding="utf-8"?>
+<p:sld xmlns:a="http://schemas.openxmlformats.org/drawingml/2006/main" xmlns:r="http://schemas.openxmlformats.org/officeDocument/2006/relationships" xmlns:p="http://schemas.openxmlformats.org/presentationml/2006/main">
+  <p:cSld>
+    <p:spTree>
+      <p:nvGrpSpPr>
+        <p:cNvPr id="1" name=""/>
+        <p:cNvGrpSpPr/>
+        <p:nvPr/>
+      </p:nvGrpSpPr>
+      <p:grpSpPr>
+        <a:xfrm>
+          <a:off x="0" y="0"/>
+          <a:ext cx="0" cy="0"/>
+          <a:chOff x="0" y="0"/>
+          <a:chExt cx="0" cy="0"/>
+        </a:xfrm>
+      </p:grpSpPr>
+      <p:sp>
+        <p:nvSpPr>
+          <p:cNvPr id="2" name="Заголовок 1"/>
+          <p:cNvSpPr>
+            <a:spLocks noGrp="1"/>
+          </p:cNvSpPr>
+          <p:nvPr>
+            <p:ph type="title"/>
+          </p:nvPr>
+        </p:nvSpPr>
+        <p:spPr/>
+        <p:txBody>
+          <a:bodyPr/>
+          <a:lstStyle/>
+          <a:p>
+            <a:r>
+              <a:rPr lang="ru-RU" dirty="0" smtClean="0"/>
+              <a:t>Результаты первого измерения (2) и второго измерения</a:t>
+            </a:r>
+            <a:endParaRPr lang="ru-RU" dirty="0"/>
+          </a:p>
+        </p:txBody>
+      </p:sp>
+      <p:sp>
+        <p:nvSpPr>
+          <p:cNvPr id="4" name="Нижний колонтитул 3"/>
+          <p:cNvSpPr>
+            <a:spLocks noGrp="1"/>
+          </p:cNvSpPr>
+          <p:nvPr>
+            <p:ph type="ftr" sz="quarter" idx="11"/>
+          </p:nvPr>
+        </p:nvSpPr>
+        <p:spPr>
+          <a:xfrm>
+            <a:off x="0" y="6410036"/>
+            <a:ext cx="12302836" cy="447964"/>
+          </a:xfrm>
+        </p:spPr>
+        <p:txBody>
+          <a:bodyPr/>
+          <a:lstStyle/>
+          <a:p>
+            <a:r>
+              <a:rPr lang="ru-RU" sz="2000" dirty="0" smtClean="0"/>
+              <a:t>СРАВНИТЕЛЬНЫЙ АНАЛИЗ АЛГОРИТМОВ ЛЕГКОВЕСНОЙ КРИПТОГРАФИИ ДЛЯ УСТРОЙСТВ ИНТЕРНЕТА </a:t>
+            </a:r>
+            <a:r>
+              <a:rPr lang="ru-RU" sz="2000" dirty="0" err="1" smtClean="0"/>
+              <a:t>ВЕЩЕй</a:t>
+            </a:r>
+            <a:endParaRPr lang="ru-RU" sz="2000" dirty="0"/>
+          </a:p>
+        </p:txBody>
+      </p:sp>
+      <p:sp>
+        <p:nvSpPr>
+          <p:cNvPr id="7" name="Номер слайда 6"/>
+          <p:cNvSpPr>
+            <a:spLocks noGrp="1"/>
+          </p:cNvSpPr>
+          <p:nvPr>
+            <p:ph type="sldNum" sz="quarter" idx="12"/>
+          </p:nvPr>
+        </p:nvSpPr>
+        <p:spPr>
+          <a:xfrm>
+            <a:off x="10611658" y="516948"/>
+            <a:ext cx="1312025" cy="365125"/>
+          </a:xfrm>
+        </p:spPr>
+        <p:txBody>
+          <a:bodyPr/>
+          <a:lstStyle/>
+          <a:p>
+            <a:fld id="{C8E71B65-08E1-4CE1-BD4B-D1F08213E75D}" type="slidenum">
+              <a:rPr lang="ru-RU" sz="3600" smtClean="0">
+                <a:solidFill>
+                  <a:schemeClr val="tx1"/>
+                </a:solidFill>
+              </a:rPr>
+              <a:t>13</a:t>
+            </a:fld>
+            <a:endParaRPr lang="ru-RU" sz="2400" dirty="0">
+              <a:solidFill>
+                <a:schemeClr val="tx1"/>
+              </a:solidFill>
+            </a:endParaRPr>
+          </a:p>
+        </p:txBody>
+      </p:sp>
+      <p:pic>
+        <p:nvPicPr>
+          <p:cNvPr id="10" name="Рисунок 9"/>
+          <p:cNvPicPr>
+            <a:picLocks noChangeAspect="1"/>
+          </p:cNvPicPr>
+          <p:nvPr/>
+        </p:nvPicPr>
+        <p:blipFill>
+          <a:blip r:embed="rId2"/>
+          <a:stretch>
+            <a:fillRect/>
+          </a:stretch>
+        </p:blipFill>
+        <p:spPr>
+          <a:xfrm>
+            <a:off x="474226" y="1971957"/>
+            <a:ext cx="5677192" cy="4007056"/>
+          </a:xfrm>
+          <a:prstGeom prst="rect">
+            <a:avLst/>
+          </a:prstGeom>
+        </p:spPr>
+      </p:pic>
+      <p:pic>
+        <p:nvPicPr>
+          <p:cNvPr id="11" name="Рисунок 10"/>
+          <p:cNvPicPr>
+            <a:picLocks noChangeAspect="1"/>
+          </p:cNvPicPr>
+          <p:nvPr/>
+        </p:nvPicPr>
+        <p:blipFill>
+          <a:blip r:embed="rId3"/>
+          <a:stretch>
+            <a:fillRect/>
+          </a:stretch>
+        </p:blipFill>
+        <p:spPr>
+          <a:xfrm>
+            <a:off x="6151236" y="1927505"/>
+            <a:ext cx="5772447" cy="4051508"/>
+          </a:xfrm>
+          <a:prstGeom prst="rect">
+            <a:avLst/>
+          </a:prstGeom>
+        </p:spPr>
+      </p:pic>
+    </p:spTree>
+    <p:extLst>
+      <p:ext uri="{BB962C8B-B14F-4D97-AF65-F5344CB8AC3E}">
+        <p14:creationId xmlns:p14="http://schemas.microsoft.com/office/powerpoint/2010/main" val="1386751643"/>
+      </p:ext>
+    </p:extLst>
+  </p:cSld>
+  <p:clrMapOvr>
+    <a:masterClrMapping/>
+  </p:clrMapOvr>
+  <p:timing>
+    <p:tnLst>
+      <p:par>
+        <p:cTn id="1" dur="indefinite" restart="never" nodeType="tmRoot"/>
+      </p:par>
+    </p:tnLst>
+  </p:timing>
+</p:sld>
+</file>
+
 <file path=ppt/slides/slide14.xml><?xml version="1.0" encoding="utf-8"?>
 <p:sld xmlns:a="http://schemas.openxmlformats.org/drawingml/2006/main" xmlns:r="http://schemas.openxmlformats.org/officeDocument/2006/relationships" xmlns:p="http://schemas.openxmlformats.org/presentationml/2006/main">
   <p:cSld>
@@ -6660,46 +6458,318 @@
           <a:p>
             <a:r>
               <a:rPr lang="ru-RU" dirty="0" smtClean="0"/>
-              <a:t>Результаты первого измерения (1)</a:t>
+              <a:t>Восстановленные уравнения прямых</a:t>
+            </a:r>
+            <a:br>
+              <a:rPr lang="ru-RU" dirty="0" smtClean="0"/>
+            </a:br>
+            <a:r>
+              <a:rPr lang="ru-RU" dirty="0" smtClean="0"/>
+              <a:t>и интерпретация результатов</a:t>
             </a:r>
             <a:endParaRPr lang="ru-RU" dirty="0"/>
           </a:p>
         </p:txBody>
       </p:sp>
-      <p:sp>
-        <p:nvSpPr>
-          <p:cNvPr id="3" name="Объект 2"/>
-          <p:cNvSpPr>
-            <a:spLocks noGrp="1"/>
-          </p:cNvSpPr>
-          <p:nvPr>
-            <p:ph idx="1"/>
-          </p:nvPr>
-        </p:nvSpPr>
-        <p:spPr>
-          <a:xfrm>
-            <a:off x="1097279" y="1845734"/>
-            <a:ext cx="10826403" cy="4259502"/>
-          </a:xfrm>
-        </p:spPr>
-        <p:txBody>
-          <a:bodyPr>
-            <a:normAutofit/>
-          </a:bodyPr>
-          <a:lstStyle/>
-          <a:p>
-            <a:pPr>
-              <a:buFont typeface="Wingdings" panose="05000000000000000000" pitchFamily="2" charset="2"/>
-              <a:buChar char="q"/>
-            </a:pPr>
-            <a:r>
-              <a:rPr lang="ru-RU" sz="2200" dirty="0" smtClean="0"/>
-              <a:t> </a:t>
-            </a:r>
-            <a:endParaRPr lang="ru-RU" sz="2200" dirty="0"/>
-          </a:p>
-        </p:txBody>
-      </p:sp>
+      <mc:AlternateContent xmlns:mc="http://schemas.openxmlformats.org/markup-compatibility/2006">
+        <mc:Choice xmlns:a14="http://schemas.microsoft.com/office/drawing/2010/main" Requires="a14">
+          <p:sp>
+            <p:nvSpPr>
+              <p:cNvPr id="3" name="Объект 2"/>
+              <p:cNvSpPr>
+                <a:spLocks noGrp="1"/>
+              </p:cNvSpPr>
+              <p:nvPr>
+                <p:ph idx="1"/>
+              </p:nvPr>
+            </p:nvSpPr>
+            <p:spPr>
+              <a:xfrm>
+                <a:off x="1097279" y="1845734"/>
+                <a:ext cx="10826403" cy="4259502"/>
+              </a:xfrm>
+            </p:spPr>
+            <p:txBody>
+              <a:bodyPr>
+                <a:noAutofit/>
+              </a:bodyPr>
+              <a:lstStyle/>
+              <a:p>
+                <a:pPr marL="0" indent="0">
+                  <a:buNone/>
+                </a:pPr>
+                <a:r>
+                  <a:rPr lang="ru-RU" dirty="0" smtClean="0"/>
+                  <a:t>                                    </a:t>
+                </a:r>
+                <a:r>
+                  <a:rPr lang="ru-RU" dirty="0"/>
+                  <a:t>Д</a:t>
+                </a:r>
+                <a:r>
+                  <a:rPr lang="ru-RU" dirty="0" smtClean="0"/>
+                  <a:t>ля измерения 1:     Для измерения 2:                       Интерпретация:</a:t>
+                </a:r>
+              </a:p>
+              <a:p>
+                <a:pPr marL="0" indent="0">
+                  <a:buNone/>
+                </a:pPr>
+                <a:r>
+                  <a:rPr lang="ru-RU" dirty="0"/>
+                  <a:t>Реализация </a:t>
+                </a:r>
+                <a:r>
+                  <a:rPr lang="ru-RU" dirty="0" smtClean="0"/>
+                  <a:t>1                                                                                               </a:t>
+                </a:r>
+                <a14:m>
+                  <m:oMath xmlns:m="http://schemas.openxmlformats.org/officeDocument/2006/math">
+                    <m:r>
+                      <a:rPr lang="ru-RU" b="0" i="1" smtClean="0">
+                        <a:latin typeface="Cambria Math" panose="02040503050406030204" pitchFamily="18" charset="0"/>
+                      </a:rPr>
+                      <m:t>0.7 мкс на блок</m:t>
+                    </m:r>
+                    <m:r>
+                      <a:rPr lang="en-US" b="0" i="1" smtClean="0">
+                        <a:latin typeface="Cambria Math" panose="02040503050406030204" pitchFamily="18" charset="0"/>
+                      </a:rPr>
+                      <m:t>=</m:t>
+                    </m:r>
+                    <m:r>
+                      <a:rPr lang="ru-RU" b="0" i="1" smtClean="0">
+                        <a:latin typeface="Cambria Math" panose="02040503050406030204" pitchFamily="18" charset="0"/>
+                      </a:rPr>
+                      <m:t>23 Мб/с</m:t>
+                    </m:r>
+                  </m:oMath>
+                </a14:m>
+                <a:endParaRPr lang="ru-RU" dirty="0" smtClean="0"/>
+              </a:p>
+              <a:p>
+                <a:pPr marL="0" indent="0">
+                  <a:buNone/>
+                </a:pPr>
+                <a:r>
+                  <a:rPr lang="ru-RU" dirty="0" smtClean="0"/>
+                  <a:t>Реализация 2                                                                                   </a:t>
+                </a:r>
+                <a:r>
+                  <a:rPr lang="ru-RU" dirty="0" smtClean="0"/>
+                  <a:t>            </a:t>
+                </a:r>
+                <a14:m>
+                  <m:oMath xmlns:m="http://schemas.openxmlformats.org/officeDocument/2006/math">
+                    <m:r>
+                      <a:rPr lang="ru-RU" i="1">
+                        <a:latin typeface="Cambria Math" panose="02040503050406030204" pitchFamily="18" charset="0"/>
+                      </a:rPr>
+                      <m:t>0.</m:t>
+                    </m:r>
+                    <m:r>
+                      <a:rPr lang="ru-RU" b="0" i="1" smtClean="0">
+                        <a:latin typeface="Cambria Math" panose="02040503050406030204" pitchFamily="18" charset="0"/>
+                      </a:rPr>
+                      <m:t>6</m:t>
+                    </m:r>
+                    <m:r>
+                      <a:rPr lang="ru-RU" i="1">
+                        <a:latin typeface="Cambria Math" panose="02040503050406030204" pitchFamily="18" charset="0"/>
+                      </a:rPr>
+                      <m:t> мкс на блок</m:t>
+                    </m:r>
+                    <m:r>
+                      <a:rPr lang="en-US" i="1">
+                        <a:latin typeface="Cambria Math" panose="02040503050406030204" pitchFamily="18" charset="0"/>
+                      </a:rPr>
+                      <m:t>=</m:t>
+                    </m:r>
+                    <m:r>
+                      <a:rPr lang="ru-RU" i="1">
+                        <a:latin typeface="Cambria Math" panose="02040503050406030204" pitchFamily="18" charset="0"/>
+                      </a:rPr>
+                      <m:t>2</m:t>
+                    </m:r>
+                    <m:r>
+                      <a:rPr lang="ru-RU" b="0" i="1" smtClean="0">
+                        <a:latin typeface="Cambria Math" panose="02040503050406030204" pitchFamily="18" charset="0"/>
+                      </a:rPr>
+                      <m:t>6 </m:t>
+                    </m:r>
+                    <m:r>
+                      <a:rPr lang="ru-RU" i="1">
+                        <a:latin typeface="Cambria Math" panose="02040503050406030204" pitchFamily="18" charset="0"/>
+                      </a:rPr>
+                      <m:t>Мб/с</m:t>
+                    </m:r>
+                  </m:oMath>
+                </a14:m>
+                <a:endParaRPr lang="ru-RU" dirty="0" smtClean="0"/>
+              </a:p>
+              <a:p>
+                <a:pPr marL="0" indent="0">
+                  <a:buNone/>
+                </a:pPr>
+                <a:r>
+                  <a:rPr lang="ru-RU" dirty="0" smtClean="0"/>
+                  <a:t>Реализация 3                                                                             </a:t>
+                </a:r>
+                <a:r>
+                  <a:rPr lang="ru-RU" dirty="0" smtClean="0"/>
+                  <a:t>                </a:t>
+                </a:r>
+                <a14:m>
+                  <m:oMath xmlns:m="http://schemas.openxmlformats.org/officeDocument/2006/math">
+                    <m:r>
+                      <a:rPr lang="ru-RU" b="0" i="0" smtClean="0">
+                        <a:latin typeface="Cambria Math" panose="02040503050406030204" pitchFamily="18" charset="0"/>
+                      </a:rPr>
+                      <m:t>100</m:t>
+                    </m:r>
+                    <m:r>
+                      <a:rPr lang="ru-RU" i="1">
+                        <a:latin typeface="Cambria Math" panose="02040503050406030204" pitchFamily="18" charset="0"/>
+                      </a:rPr>
+                      <m:t> мкс на блок</m:t>
+                    </m:r>
+                    <m:r>
+                      <a:rPr lang="en-US" i="1">
+                        <a:latin typeface="Cambria Math" panose="02040503050406030204" pitchFamily="18" charset="0"/>
+                      </a:rPr>
+                      <m:t>=</m:t>
+                    </m:r>
+                    <m:r>
+                      <a:rPr lang="ru-RU" b="0" i="1" smtClean="0">
+                        <a:latin typeface="Cambria Math" panose="02040503050406030204" pitchFamily="18" charset="0"/>
+                      </a:rPr>
+                      <m:t>0.16 </m:t>
+                    </m:r>
+                    <m:r>
+                      <a:rPr lang="ru-RU" i="1">
+                        <a:latin typeface="Cambria Math" panose="02040503050406030204" pitchFamily="18" charset="0"/>
+                      </a:rPr>
+                      <m:t>Мб/с</m:t>
+                    </m:r>
+                  </m:oMath>
+                </a14:m>
+                <a:endParaRPr lang="ru-RU" dirty="0" smtClean="0"/>
+              </a:p>
+              <a:p>
+                <a:pPr marL="0" indent="0">
+                  <a:buNone/>
+                </a:pPr>
+                <a:r>
+                  <a:rPr lang="ru-RU" dirty="0" smtClean="0"/>
+                  <a:t>Алгоритм не содержит </a:t>
+                </a:r>
+                <a:r>
+                  <a:rPr lang="ru-RU" dirty="0" smtClean="0"/>
+                  <a:t>инициализации (кроме генерации раундовых ключей), </a:t>
+                </a:r>
+                <a:r>
+                  <a:rPr lang="ru-RU" dirty="0" smtClean="0"/>
+                  <a:t>уменьшающаяся задержка </a:t>
+                </a:r>
+                <a:r>
+                  <a:rPr lang="ru-RU" dirty="0" smtClean="0"/>
+                  <a:t>отчасти связана</a:t>
+                </a:r>
+                <a:r>
+                  <a:rPr lang="ru-RU" dirty="0" smtClean="0"/>
+                  <a:t>, предположительно, с не мгновенным выделением системных ресурсов.</a:t>
+                </a:r>
+                <a:endParaRPr lang="ru-RU" dirty="0"/>
+              </a:p>
+              <a:p>
+                <a:pPr marL="0" indent="0">
+                  <a:buNone/>
+                </a:pPr>
+                <a:r>
+                  <a:rPr lang="ru-RU" dirty="0" smtClean="0"/>
+                  <a:t>Итого:</a:t>
+                </a:r>
+              </a:p>
+              <a:p>
+                <a:pPr>
+                  <a:buFont typeface="Wingdings" panose="05000000000000000000" pitchFamily="2" charset="2"/>
+                  <a:buChar char="q"/>
+                </a:pPr>
+                <a:r>
+                  <a:rPr lang="ru-RU" dirty="0"/>
+                  <a:t> </a:t>
+                </a:r>
+                <a:r>
+                  <a:rPr lang="ru-RU" dirty="0" smtClean="0"/>
+                  <a:t>Эксперимент соответствует теоретическим ожиданиям (точки ложатся на прямую).</a:t>
+                </a:r>
+              </a:p>
+              <a:p>
+                <a:pPr>
+                  <a:buFont typeface="Wingdings" panose="05000000000000000000" pitchFamily="2" charset="2"/>
+                  <a:buChar char="q"/>
+                </a:pPr>
+                <a:r>
+                  <a:rPr lang="ru-RU" dirty="0" smtClean="0"/>
+                  <a:t> Высокая робастность.</a:t>
+                </a:r>
+              </a:p>
+              <a:p>
+                <a:pPr>
+                  <a:buFont typeface="Wingdings" panose="05000000000000000000" pitchFamily="2" charset="2"/>
+                  <a:buChar char="q"/>
+                </a:pPr>
+                <a:r>
+                  <a:rPr lang="ru-RU" dirty="0"/>
+                  <a:t> </a:t>
+                </a:r>
+                <a:r>
+                  <a:rPr lang="ru-RU" dirty="0" smtClean="0"/>
+                  <a:t>Слабая зависимость результатов от объема входа (600 блоков = 9.6 Кб).</a:t>
+                </a:r>
+                <a:endParaRPr lang="ru-RU" dirty="0"/>
+              </a:p>
+            </p:txBody>
+          </p:sp>
+        </mc:Choice>
+        <mc:Fallback>
+          <p:sp>
+            <p:nvSpPr>
+              <p:cNvPr id="3" name="Объект 2"/>
+              <p:cNvSpPr>
+                <a:spLocks noGrp="1" noRot="1" noChangeAspect="1" noMove="1" noResize="1" noEditPoints="1" noAdjustHandles="1" noChangeArrowheads="1" noChangeShapeType="1" noTextEdit="1"/>
+              </p:cNvSpPr>
+              <p:nvPr>
+                <p:ph idx="1"/>
+              </p:nvPr>
+            </p:nvSpPr>
+            <p:spPr>
+              <a:xfrm>
+                <a:off x="1097279" y="1845734"/>
+                <a:ext cx="10826403" cy="4259502"/>
+              </a:xfrm>
+              <a:blipFill>
+                <a:blip r:embed="rId2"/>
+                <a:stretch>
+                  <a:fillRect l="-1408" t="-1574" r="-1126" b="-2432"/>
+                </a:stretch>
+              </a:blipFill>
+            </p:spPr>
+            <p:txBody>
+              <a:bodyPr/>
+              <a:lstStyle/>
+              <a:p>
+                <a:r>
+                  <a:rPr lang="ru-RU">
+                    <a:noFill/>
+                  </a:rPr>
+                  <a:t> </a:t>
+                </a:r>
+              </a:p>
+            </p:txBody>
+          </p:sp>
+        </mc:Fallback>
+      </mc:AlternateContent>
       <p:sp>
         <p:nvSpPr>
           <p:cNvPr id="4" name="Нижний колонтитул 3"/>
@@ -6776,16 +6846,15 @@
           </p:cNvPicPr>
           <p:nvPr/>
         </p:nvPicPr>
-        <p:blipFill>
-          <a:blip r:embed="rId2"/>
-          <a:stretch>
-            <a:fillRect/>
-          </a:stretch>
+        <p:blipFill rotWithShape="1">
+          <a:blip r:embed="rId3"/>
+          <a:srcRect b="12551"/>
+          <a:stretch/>
         </p:blipFill>
         <p:spPr>
           <a:xfrm>
-            <a:off x="605238" y="1787236"/>
-            <a:ext cx="5521242" cy="4076432"/>
+            <a:off x="3068220" y="2214476"/>
+            <a:ext cx="2329052" cy="1345296"/>
           </a:xfrm>
           <a:prstGeom prst="rect">
             <a:avLst/>
@@ -6801,15 +6870,15 @@
           <p:nvPr/>
         </p:nvPicPr>
         <p:blipFill>
-          <a:blip r:embed="rId3"/>
+          <a:blip r:embed="rId4"/>
           <a:stretch>
             <a:fillRect/>
           </a:stretch>
         </p:blipFill>
         <p:spPr>
           <a:xfrm>
-            <a:off x="6126480" y="1737360"/>
-            <a:ext cx="5637168" cy="4169958"/>
+            <a:off x="5319617" y="2235078"/>
+            <a:ext cx="2227240" cy="1369340"/>
           </a:xfrm>
           <a:prstGeom prst="rect">
             <a:avLst/>
@@ -6819,7 +6888,7 @@
     </p:spTree>
     <p:extLst>
       <p:ext uri="{BB962C8B-B14F-4D97-AF65-F5344CB8AC3E}">
-        <p14:creationId xmlns:p14="http://schemas.microsoft.com/office/powerpoint/2010/main" val="2021568438"/>
+        <p14:creationId xmlns:p14="http://schemas.microsoft.com/office/powerpoint/2010/main" val="815026918"/>
       </p:ext>
     </p:extLst>
   </p:cSld>
@@ -6870,9 +6939,181 @@
           <a:p>
             <a:r>
               <a:rPr lang="ru-RU" dirty="0" smtClean="0"/>
-              <a:t>Результаты первого измерения (2) и второго измерения</a:t>
+              <a:t>Итоги </a:t>
+            </a:r>
+            <a:r>
+              <a:rPr lang="ru-RU" dirty="0" smtClean="0"/>
+              <a:t>работы</a:t>
             </a:r>
             <a:endParaRPr lang="ru-RU" dirty="0"/>
+          </a:p>
+        </p:txBody>
+      </p:sp>
+      <p:sp>
+        <p:nvSpPr>
+          <p:cNvPr id="3" name="Объект 2"/>
+          <p:cNvSpPr>
+            <a:spLocks noGrp="1"/>
+          </p:cNvSpPr>
+          <p:nvPr>
+            <p:ph idx="1"/>
+          </p:nvPr>
+        </p:nvSpPr>
+        <p:spPr>
+          <a:xfrm>
+            <a:off x="738909" y="1845734"/>
+            <a:ext cx="11184773" cy="4259502"/>
+          </a:xfrm>
+        </p:spPr>
+        <p:txBody>
+          <a:bodyPr>
+            <a:normAutofit/>
+          </a:bodyPr>
+          <a:lstStyle/>
+          <a:p>
+            <a:pPr>
+              <a:buFont typeface="Wingdings" panose="05000000000000000000" pitchFamily="2" charset="2"/>
+              <a:buChar char="q"/>
+            </a:pPr>
+            <a:r>
+              <a:rPr lang="ru-RU" sz="2400" dirty="0" smtClean="0"/>
+              <a:t> Проведен обзор </a:t>
+            </a:r>
+            <a:r>
+              <a:rPr lang="ru-RU" sz="2400" dirty="0"/>
+              <a:t>литературы по криптографии и </a:t>
+            </a:r>
+            <a:r>
+              <a:rPr lang="en-US" sz="2400" dirty="0" err="1"/>
+              <a:t>IoT</a:t>
+            </a:r>
+            <a:r>
+              <a:rPr lang="ru-RU" sz="2400" dirty="0"/>
+              <a:t> (выделение угроз).</a:t>
+            </a:r>
+          </a:p>
+          <a:p>
+            <a:pPr>
+              <a:buFont typeface="Wingdings" panose="05000000000000000000" pitchFamily="2" charset="2"/>
+              <a:buChar char="q"/>
+            </a:pPr>
+            <a:r>
+              <a:rPr lang="ru-RU" sz="2400" dirty="0"/>
+              <a:t> </a:t>
+            </a:r>
+            <a:r>
+              <a:rPr lang="ru-RU" sz="2400" dirty="0" smtClean="0"/>
+              <a:t>Проведен обзор </a:t>
+            </a:r>
+            <a:r>
+              <a:rPr lang="ru-RU" sz="2400" dirty="0"/>
+              <a:t>существующих подходов к (решению задачи) защите трафика.</a:t>
+            </a:r>
+          </a:p>
+          <a:p>
+            <a:pPr>
+              <a:buFont typeface="Wingdings" panose="05000000000000000000" pitchFamily="2" charset="2"/>
+              <a:buChar char="q"/>
+            </a:pPr>
+            <a:r>
+              <a:rPr lang="ru-RU" sz="2400" dirty="0"/>
+              <a:t> </a:t>
+            </a:r>
+            <a:r>
+              <a:rPr lang="ru-RU" sz="2400" dirty="0" smtClean="0"/>
+              <a:t>Выполнено сравнение </a:t>
+            </a:r>
+            <a:r>
+              <a:rPr lang="ru-RU" sz="2400" dirty="0"/>
+              <a:t>различных алгоритмов (для отражения конкретных угроз).</a:t>
+            </a:r>
+          </a:p>
+          <a:p>
+            <a:pPr>
+              <a:buFont typeface="Wingdings" panose="05000000000000000000" pitchFamily="2" charset="2"/>
+              <a:buChar char="q"/>
+            </a:pPr>
+            <a:r>
+              <a:rPr lang="ru-RU" sz="2400" dirty="0"/>
+              <a:t> </a:t>
+            </a:r>
+            <a:r>
+              <a:rPr lang="ru-RU" sz="2400" dirty="0" smtClean="0"/>
+              <a:t>Создана методология </a:t>
+            </a:r>
+            <a:r>
+              <a:rPr lang="ru-RU" sz="2400" dirty="0"/>
+              <a:t>сравнительного тестирования реализаций шифров на пригодность для устройств </a:t>
+            </a:r>
+            <a:r>
+              <a:rPr lang="en-US" sz="2400" dirty="0" err="1" smtClean="0"/>
+              <a:t>IoT</a:t>
+            </a:r>
+            <a:r>
+              <a:rPr lang="ru-RU" sz="2400" dirty="0" smtClean="0"/>
+              <a:t> (</a:t>
+            </a:r>
+            <a:r>
+              <a:rPr lang="ru-RU" sz="2400" dirty="0"/>
+              <a:t>по параметрам производительности и мощности энергопотребления)</a:t>
+            </a:r>
+            <a:r>
+              <a:rPr lang="en-US" sz="2400" dirty="0" smtClean="0"/>
+              <a:t>.</a:t>
+            </a:r>
+            <a:endParaRPr lang="en-US" sz="2400" dirty="0"/>
+          </a:p>
+          <a:p>
+            <a:pPr>
+              <a:buFont typeface="Wingdings" panose="05000000000000000000" pitchFamily="2" charset="2"/>
+              <a:buChar char="q"/>
+            </a:pPr>
+            <a:r>
+              <a:rPr lang="ru-RU" sz="2400" dirty="0" smtClean="0"/>
+              <a:t> Методология прошла апробацию </a:t>
+            </a:r>
+            <a:r>
+              <a:rPr lang="ru-RU" sz="2400" dirty="0"/>
+              <a:t>(в части тестирования производительности</a:t>
+            </a:r>
+            <a:r>
+              <a:rPr lang="ru-RU" sz="2400" dirty="0" smtClean="0"/>
+              <a:t>) путем </a:t>
+            </a:r>
+            <a:r>
+              <a:rPr lang="ru-RU" sz="2400" dirty="0"/>
+              <a:t>реализация тестирования.</a:t>
+            </a:r>
+          </a:p>
+          <a:p>
+            <a:pPr>
+              <a:buFont typeface="Wingdings" panose="05000000000000000000" pitchFamily="2" charset="2"/>
+              <a:buChar char="q"/>
+            </a:pPr>
+            <a:r>
+              <a:rPr lang="ru-RU" sz="2400" dirty="0"/>
+              <a:t> </a:t>
+            </a:r>
+            <a:r>
+              <a:rPr lang="ru-RU" sz="2400" dirty="0" smtClean="0"/>
+              <a:t>Сформулированы итоговые рекомендации по использованию </a:t>
+            </a:r>
+            <a:r>
+              <a:rPr lang="ru-RU" sz="2400" dirty="0" err="1" smtClean="0"/>
+              <a:t>криптоалгоритмов</a:t>
+            </a:r>
+            <a:r>
+              <a:rPr lang="ru-RU" sz="2400" dirty="0" smtClean="0"/>
+              <a:t>.</a:t>
+            </a:r>
+            <a:endParaRPr lang="ru-RU" sz="2400" dirty="0" smtClean="0"/>
+          </a:p>
+          <a:p>
+            <a:pPr>
+              <a:buFont typeface="Wingdings" panose="05000000000000000000" pitchFamily="2" charset="2"/>
+              <a:buChar char="q"/>
+            </a:pPr>
+            <a:endParaRPr lang="ru-RU" sz="2400" dirty="0"/>
           </a:p>
         </p:txBody>
       </p:sp>
@@ -6944,58 +7185,10 @@
           </a:p>
         </p:txBody>
       </p:sp>
-      <p:pic>
-        <p:nvPicPr>
-          <p:cNvPr id="10" name="Рисунок 9"/>
-          <p:cNvPicPr>
-            <a:picLocks noChangeAspect="1"/>
-          </p:cNvPicPr>
-          <p:nvPr/>
-        </p:nvPicPr>
-        <p:blipFill>
-          <a:blip r:embed="rId2"/>
-          <a:stretch>
-            <a:fillRect/>
-          </a:stretch>
-        </p:blipFill>
-        <p:spPr>
-          <a:xfrm>
-            <a:off x="474226" y="1971957"/>
-            <a:ext cx="5677192" cy="4007056"/>
-          </a:xfrm>
-          <a:prstGeom prst="rect">
-            <a:avLst/>
-          </a:prstGeom>
-        </p:spPr>
-      </p:pic>
-      <p:pic>
-        <p:nvPicPr>
-          <p:cNvPr id="11" name="Рисунок 10"/>
-          <p:cNvPicPr>
-            <a:picLocks noChangeAspect="1"/>
-          </p:cNvPicPr>
-          <p:nvPr/>
-        </p:nvPicPr>
-        <p:blipFill>
-          <a:blip r:embed="rId3"/>
-          <a:stretch>
-            <a:fillRect/>
-          </a:stretch>
-        </p:blipFill>
-        <p:spPr>
-          <a:xfrm>
-            <a:off x="6151236" y="1927505"/>
-            <a:ext cx="5772447" cy="4051508"/>
-          </a:xfrm>
-          <a:prstGeom prst="rect">
-            <a:avLst/>
-          </a:prstGeom>
-        </p:spPr>
-      </p:pic>
     </p:spTree>
     <p:extLst>
       <p:ext uri="{BB962C8B-B14F-4D97-AF65-F5344CB8AC3E}">
-        <p14:creationId xmlns:p14="http://schemas.microsoft.com/office/powerpoint/2010/main" val="1386751643"/>
+        <p14:creationId xmlns:p14="http://schemas.microsoft.com/office/powerpoint/2010/main" val="2409987466"/>
       </p:ext>
     </p:extLst>
   </p:cSld>
@@ -7046,298 +7239,199 @@
           <a:p>
             <a:r>
               <a:rPr lang="ru-RU" dirty="0" smtClean="0"/>
-              <a:t>Восстановленные уравнения прямых</a:t>
-            </a:r>
-            <a:br>
-              <a:rPr lang="ru-RU" dirty="0" smtClean="0"/>
-            </a:br>
-            <a:r>
-              <a:rPr lang="ru-RU" dirty="0" smtClean="0"/>
-              <a:t>и интерпретация результатов</a:t>
+              <a:t>Перспективы развития</a:t>
             </a:r>
             <a:endParaRPr lang="ru-RU" dirty="0"/>
           </a:p>
         </p:txBody>
       </p:sp>
-      <mc:AlternateContent xmlns:mc="http://schemas.openxmlformats.org/markup-compatibility/2006" xmlns:a14="http://schemas.microsoft.com/office/drawing/2010/main">
-        <mc:Choice Requires="a14">
-          <p:sp>
-            <p:nvSpPr>
-              <p:cNvPr id="3" name="Объект 2"/>
-              <p:cNvSpPr>
-                <a:spLocks noGrp="1"/>
-              </p:cNvSpPr>
-              <p:nvPr>
-                <p:ph idx="1"/>
-              </p:nvPr>
-            </p:nvSpPr>
-            <p:spPr>
-              <a:xfrm>
-                <a:off x="1097279" y="1845734"/>
-                <a:ext cx="10826403" cy="4259502"/>
-              </a:xfrm>
-            </p:spPr>
-            <p:txBody>
-              <a:bodyPr>
-                <a:normAutofit fontScale="92500" lnSpcReduction="10000"/>
-              </a:bodyPr>
-              <a:lstStyle/>
-              <a:p>
-                <a:pPr marL="0" indent="0">
-                  <a:buNone/>
-                </a:pPr>
-                <a:r>
-                  <a:rPr lang="ru-RU" sz="2200" dirty="0" smtClean="0"/>
-                  <a:t>                                    </a:t>
-                </a:r>
-                <a:r>
-                  <a:rPr lang="ru-RU" sz="2200" dirty="0"/>
-                  <a:t>Д</a:t>
-                </a:r>
-                <a:r>
-                  <a:rPr lang="ru-RU" sz="2200" dirty="0" smtClean="0"/>
-                  <a:t>ля измерения 1:     Для измерения 2:                       Интерпретация:</a:t>
-                </a:r>
-              </a:p>
-              <a:p>
-                <a:pPr marL="0" indent="0">
-                  <a:buNone/>
-                </a:pPr>
-                <a:r>
-                  <a:rPr lang="ru-RU" sz="2400" dirty="0"/>
-                  <a:t>Реализация </a:t>
-                </a:r>
-                <a:r>
-                  <a:rPr lang="ru-RU" sz="2400" dirty="0" smtClean="0"/>
-                  <a:t>1</a:t>
-                </a:r>
-                <a:r>
-                  <a:rPr lang="ru-RU" sz="2200" dirty="0" smtClean="0"/>
-                  <a:t>                                                                                               </a:t>
-                </a:r>
-                <a14:m>
-                  <m:oMath xmlns:m="http://schemas.openxmlformats.org/officeDocument/2006/math">
-                    <m:r>
-                      <a:rPr lang="ru-RU" sz="2200" b="0" i="1" smtClean="0">
-                        <a:latin typeface="Cambria Math" panose="02040503050406030204" pitchFamily="18" charset="0"/>
-                      </a:rPr>
-                      <m:t>0.7 мкс на блок</m:t>
-                    </m:r>
-                    <m:r>
-                      <a:rPr lang="en-US" sz="2200" b="0" i="1" smtClean="0">
-                        <a:latin typeface="Cambria Math" panose="02040503050406030204" pitchFamily="18" charset="0"/>
-                      </a:rPr>
-                      <m:t>=</m:t>
-                    </m:r>
-                    <m:r>
-                      <a:rPr lang="ru-RU" sz="2200" b="0" i="1" smtClean="0">
-                        <a:latin typeface="Cambria Math" panose="02040503050406030204" pitchFamily="18" charset="0"/>
-                      </a:rPr>
-                      <m:t>23 Мб/с</m:t>
-                    </m:r>
-                  </m:oMath>
-                </a14:m>
-                <a:endParaRPr lang="ru-RU" sz="2200" dirty="0" smtClean="0"/>
-              </a:p>
-              <a:p>
-                <a:pPr marL="0" indent="0">
-                  <a:buNone/>
-                </a:pPr>
-                <a:r>
-                  <a:rPr lang="ru-RU" sz="2400" dirty="0" smtClean="0"/>
-                  <a:t>Реализация 2                                                                                     </a:t>
-                </a:r>
-                <a14:m>
-                  <m:oMath xmlns:m="http://schemas.openxmlformats.org/officeDocument/2006/math">
-                    <m:r>
-                      <a:rPr lang="ru-RU" sz="2200" i="1">
-                        <a:latin typeface="Cambria Math" panose="02040503050406030204" pitchFamily="18" charset="0"/>
-                      </a:rPr>
-                      <m:t>0.</m:t>
-                    </m:r>
-                    <m:r>
-                      <a:rPr lang="ru-RU" sz="2200" b="0" i="1" smtClean="0">
-                        <a:latin typeface="Cambria Math" panose="02040503050406030204" pitchFamily="18" charset="0"/>
-                      </a:rPr>
-                      <m:t>6</m:t>
-                    </m:r>
-                    <m:r>
-                      <a:rPr lang="ru-RU" sz="2200" i="1">
-                        <a:latin typeface="Cambria Math" panose="02040503050406030204" pitchFamily="18" charset="0"/>
-                      </a:rPr>
-                      <m:t> мкс на блок</m:t>
-                    </m:r>
-                    <m:r>
-                      <a:rPr lang="en-US" sz="2200" i="1">
-                        <a:latin typeface="Cambria Math" panose="02040503050406030204" pitchFamily="18" charset="0"/>
-                      </a:rPr>
-                      <m:t>=</m:t>
-                    </m:r>
-                    <m:r>
-                      <a:rPr lang="ru-RU" sz="2200" i="1">
-                        <a:latin typeface="Cambria Math" panose="02040503050406030204" pitchFamily="18" charset="0"/>
-                      </a:rPr>
-                      <m:t>2</m:t>
-                    </m:r>
-                    <m:r>
-                      <a:rPr lang="ru-RU" sz="2200" b="0" i="1" smtClean="0">
-                        <a:latin typeface="Cambria Math" panose="02040503050406030204" pitchFamily="18" charset="0"/>
-                      </a:rPr>
-                      <m:t>6 </m:t>
-                    </m:r>
-                    <m:r>
-                      <a:rPr lang="ru-RU" sz="2200" i="1">
-                        <a:latin typeface="Cambria Math" panose="02040503050406030204" pitchFamily="18" charset="0"/>
-                      </a:rPr>
-                      <m:t>Мб/с</m:t>
-                    </m:r>
-                  </m:oMath>
-                </a14:m>
-                <a:endParaRPr lang="ru-RU" sz="2200" dirty="0" smtClean="0"/>
-              </a:p>
-              <a:p>
-                <a:pPr marL="0" indent="0">
-                  <a:buNone/>
-                </a:pPr>
-                <a:r>
-                  <a:rPr lang="ru-RU" sz="2400" dirty="0" smtClean="0"/>
-                  <a:t>Реализация 3                                                                                  </a:t>
-                </a:r>
-                <a14:m>
-                  <m:oMath xmlns:m="http://schemas.openxmlformats.org/officeDocument/2006/math">
-                    <m:r>
-                      <a:rPr lang="ru-RU" sz="2200" b="0" i="0" smtClean="0">
-                        <a:latin typeface="Cambria Math" panose="02040503050406030204" pitchFamily="18" charset="0"/>
-                      </a:rPr>
-                      <m:t>100</m:t>
-                    </m:r>
-                    <m:r>
-                      <a:rPr lang="ru-RU" sz="2200" i="1">
-                        <a:latin typeface="Cambria Math" panose="02040503050406030204" pitchFamily="18" charset="0"/>
-                      </a:rPr>
-                      <m:t> мкс на блок</m:t>
-                    </m:r>
-                    <m:r>
-                      <a:rPr lang="en-US" sz="2200" i="1">
-                        <a:latin typeface="Cambria Math" panose="02040503050406030204" pitchFamily="18" charset="0"/>
-                      </a:rPr>
-                      <m:t>=</m:t>
-                    </m:r>
-                    <m:r>
-                      <a:rPr lang="ru-RU" sz="2200" b="0" i="1" smtClean="0">
-                        <a:latin typeface="Cambria Math" panose="02040503050406030204" pitchFamily="18" charset="0"/>
-                      </a:rPr>
-                      <m:t>0.16 </m:t>
-                    </m:r>
-                    <m:r>
-                      <a:rPr lang="ru-RU" sz="2200" i="1">
-                        <a:latin typeface="Cambria Math" panose="02040503050406030204" pitchFamily="18" charset="0"/>
-                      </a:rPr>
-                      <m:t>Мб/с</m:t>
-                    </m:r>
-                  </m:oMath>
-                </a14:m>
-                <a:endParaRPr lang="ru-RU" sz="2200" dirty="0" smtClean="0"/>
-              </a:p>
-              <a:p>
-                <a:pPr marL="0" indent="0">
-                  <a:buNone/>
-                </a:pPr>
-                <a:r>
-                  <a:rPr lang="ru-RU" sz="2200" dirty="0" smtClean="0"/>
-                  <a:t>Алгоритм не содержит инициализации, уменьшающаяся задержка связана, предположительно, с не мгновенным выделением системных ресурсов.</a:t>
-                </a:r>
-                <a:endParaRPr lang="ru-RU" sz="2200" dirty="0"/>
-              </a:p>
-              <a:p>
-                <a:pPr marL="0" indent="0">
-                  <a:buNone/>
-                </a:pPr>
-                <a:r>
-                  <a:rPr lang="ru-RU" sz="2200" dirty="0" smtClean="0"/>
-                  <a:t>Итого:</a:t>
-                </a:r>
-              </a:p>
-              <a:p>
-                <a:pPr>
-                  <a:buFont typeface="Wingdings" panose="05000000000000000000" pitchFamily="2" charset="2"/>
-                  <a:buChar char="q"/>
-                </a:pPr>
-                <a:r>
-                  <a:rPr lang="ru-RU" sz="2200" dirty="0"/>
-                  <a:t> </a:t>
-                </a:r>
-                <a:r>
-                  <a:rPr lang="ru-RU" sz="2200" dirty="0" smtClean="0"/>
-                  <a:t>Эксперимент соответствует теоретическим ожиданиям (точки ложатся на прямую).</a:t>
-                </a:r>
-              </a:p>
-              <a:p>
-                <a:pPr>
-                  <a:buFont typeface="Wingdings" panose="05000000000000000000" pitchFamily="2" charset="2"/>
-                  <a:buChar char="q"/>
-                </a:pPr>
-                <a:r>
-                  <a:rPr lang="ru-RU" sz="2200" dirty="0" smtClean="0"/>
-                  <a:t> Высокая робастность.</a:t>
-                </a:r>
-              </a:p>
-              <a:p>
-                <a:pPr>
-                  <a:buFont typeface="Wingdings" panose="05000000000000000000" pitchFamily="2" charset="2"/>
-                  <a:buChar char="q"/>
-                </a:pPr>
-                <a:r>
-                  <a:rPr lang="ru-RU" sz="2200" dirty="0"/>
-                  <a:t> </a:t>
-                </a:r>
-                <a:r>
-                  <a:rPr lang="ru-RU" sz="2200" dirty="0" smtClean="0"/>
-                  <a:t>Слабая зависимость результатов от объема входа (600 блоков = 9.6 Кб).</a:t>
-                </a:r>
-                <a:endParaRPr lang="ru-RU" sz="2200" dirty="0"/>
-              </a:p>
-            </p:txBody>
-          </p:sp>
-        </mc:Choice>
-        <mc:Fallback xmlns="">
-          <p:sp>
-            <p:nvSpPr>
-              <p:cNvPr id="3" name="Объект 2"/>
-              <p:cNvSpPr>
-                <a:spLocks noGrp="1" noRot="1" noChangeAspect="1" noMove="1" noResize="1" noEditPoints="1" noAdjustHandles="1" noChangeArrowheads="1" noChangeShapeType="1" noTextEdit="1"/>
-              </p:cNvSpPr>
-              <p:nvPr>
-                <p:ph idx="1"/>
-              </p:nvPr>
-            </p:nvSpPr>
-            <p:spPr>
-              <a:xfrm>
-                <a:off x="1097279" y="1845734"/>
-                <a:ext cx="10826403" cy="4259502"/>
-              </a:xfrm>
-              <a:blipFill>
-                <a:blip r:embed="rId2"/>
-                <a:stretch>
-                  <a:fillRect l="-1577" t="-2146"/>
-                </a:stretch>
-              </a:blipFill>
-            </p:spPr>
-            <p:txBody>
-              <a:bodyPr/>
-              <a:lstStyle/>
-              <a:p>
-                <a:r>
-                  <a:rPr lang="ru-RU">
-                    <a:noFill/>
-                  </a:rPr>
-                  <a:t> </a:t>
-                </a:r>
-              </a:p>
-            </p:txBody>
-          </p:sp>
-        </mc:Fallback>
-      </mc:AlternateContent>
+      <p:sp>
+        <p:nvSpPr>
+          <p:cNvPr id="3" name="Объект 2"/>
+          <p:cNvSpPr>
+            <a:spLocks noGrp="1"/>
+          </p:cNvSpPr>
+          <p:nvPr>
+            <p:ph idx="1"/>
+          </p:nvPr>
+        </p:nvSpPr>
+        <p:spPr>
+          <a:xfrm>
+            <a:off x="600365" y="1845734"/>
+            <a:ext cx="11490036" cy="4259502"/>
+          </a:xfrm>
+        </p:spPr>
+        <p:txBody>
+          <a:bodyPr>
+            <a:normAutofit/>
+          </a:bodyPr>
+          <a:lstStyle/>
+          <a:p>
+            <a:pPr>
+              <a:buFont typeface="Wingdings" panose="05000000000000000000" pitchFamily="2" charset="2"/>
+              <a:buChar char="q"/>
+            </a:pPr>
+            <a:r>
+              <a:rPr lang="ru-RU" sz="2400" dirty="0" smtClean="0"/>
+              <a:t> Практические </a:t>
+            </a:r>
+            <a:r>
+              <a:rPr lang="ru-RU" sz="2400" dirty="0" smtClean="0"/>
+              <a:t>результаты и перспективы использования:</a:t>
+            </a:r>
+            <a:endParaRPr lang="ru-RU" sz="2400" dirty="0" smtClean="0"/>
+          </a:p>
+          <a:p>
+            <a:pPr lvl="1">
+              <a:buFont typeface="Wingdings" panose="05000000000000000000" pitchFamily="2" charset="2"/>
+              <a:buChar char="q"/>
+            </a:pPr>
+            <a:r>
+              <a:rPr lang="ru-RU" sz="2200" dirty="0"/>
+              <a:t> </a:t>
+            </a:r>
+            <a:r>
+              <a:rPr lang="ru-RU" sz="2200" dirty="0" smtClean="0"/>
+              <a:t>Выделены перспективные виды алгоритмов для использования на устройствах </a:t>
+            </a:r>
+            <a:r>
+              <a:rPr lang="en-US" sz="2200" dirty="0" err="1" smtClean="0"/>
+              <a:t>IoT</a:t>
+            </a:r>
+            <a:r>
+              <a:rPr lang="en-US" sz="2200" dirty="0" smtClean="0"/>
+              <a:t>.</a:t>
+            </a:r>
+            <a:endParaRPr lang="ru-RU" sz="2200" dirty="0" smtClean="0"/>
+          </a:p>
+          <a:p>
+            <a:pPr lvl="1">
+              <a:buFont typeface="Wingdings" panose="05000000000000000000" pitchFamily="2" charset="2"/>
+              <a:buChar char="q"/>
+            </a:pPr>
+            <a:r>
+              <a:rPr lang="ru-RU" sz="2200" dirty="0"/>
+              <a:t> </a:t>
+            </a:r>
+            <a:r>
+              <a:rPr lang="ru-RU" sz="2200" dirty="0" smtClean="0"/>
+              <a:t>Методика тестирования производительности готова к применению на других алгоритмах.</a:t>
+            </a:r>
+          </a:p>
+          <a:p>
+            <a:pPr>
+              <a:buFont typeface="Wingdings" panose="05000000000000000000" pitchFamily="2" charset="2"/>
+              <a:buChar char="q"/>
+            </a:pPr>
+            <a:r>
+              <a:rPr lang="ru-RU" sz="2600" dirty="0" smtClean="0"/>
+              <a:t> Возникшие вопросы для дальнейших исследований:</a:t>
+            </a:r>
+          </a:p>
+          <a:p>
+            <a:pPr marL="274320" lvl="2" indent="-91440">
+              <a:spcBef>
+                <a:spcPts val="1200"/>
+              </a:spcBef>
+              <a:spcAft>
+                <a:spcPts val="200"/>
+              </a:spcAft>
+              <a:buSzPct val="100000"/>
+              <a:buFont typeface="Wingdings" panose="05000000000000000000" pitchFamily="2" charset="2"/>
+              <a:buChar char="q"/>
+            </a:pPr>
+            <a:r>
+              <a:rPr lang="ru-RU" sz="2400" dirty="0"/>
+              <a:t> </a:t>
+            </a:r>
+            <a:r>
+              <a:rPr lang="ru-RU" sz="2200" dirty="0" smtClean="0"/>
+              <a:t>Методика </a:t>
+            </a:r>
+            <a:r>
+              <a:rPr lang="ru-RU" sz="2200" dirty="0"/>
+              <a:t>тестирования энергопотребления требует апробации в будущем</a:t>
+            </a:r>
+            <a:r>
+              <a:rPr lang="ru-RU" sz="2200" dirty="0" smtClean="0"/>
+              <a:t>.</a:t>
+            </a:r>
+            <a:endParaRPr lang="ru-RU" sz="2200" dirty="0" smtClean="0"/>
+          </a:p>
+          <a:p>
+            <a:pPr lvl="1">
+              <a:buFont typeface="Wingdings" panose="05000000000000000000" pitchFamily="2" charset="2"/>
+              <a:buChar char="q"/>
+            </a:pPr>
+            <a:r>
+              <a:rPr lang="ru-RU" sz="2200" dirty="0"/>
+              <a:t> </a:t>
+            </a:r>
+            <a:r>
+              <a:rPr lang="ru-RU" sz="2200" dirty="0" smtClean="0"/>
+              <a:t>Как </a:t>
+            </a:r>
+            <a:r>
+              <a:rPr lang="ru-RU" sz="2200" dirty="0" smtClean="0"/>
+              <a:t>взаимодействуют процессорные команды?</a:t>
+            </a:r>
+          </a:p>
+          <a:p>
+            <a:pPr lvl="1">
+              <a:buFont typeface="Wingdings" panose="05000000000000000000" pitchFamily="2" charset="2"/>
+              <a:buChar char="q"/>
+            </a:pPr>
+            <a:r>
+              <a:rPr lang="ru-RU" sz="2200" dirty="0"/>
+              <a:t> </a:t>
+            </a:r>
+            <a:r>
+              <a:rPr lang="ru-RU" sz="2200" dirty="0" smtClean="0"/>
+              <a:t>Насколько хорошо работает </a:t>
+            </a:r>
+            <a:r>
+              <a:rPr lang="ru-RU" sz="2200" dirty="0" err="1" smtClean="0"/>
+              <a:t>внутрипроцессорная</a:t>
+            </a:r>
+            <a:r>
+              <a:rPr lang="ru-RU" sz="2200" dirty="0" smtClean="0"/>
+              <a:t> оптимизация и параллелизм</a:t>
+            </a:r>
+          </a:p>
+          <a:p>
+            <a:pPr marL="201168" lvl="1" indent="0">
+              <a:buNone/>
+            </a:pPr>
+            <a:r>
+              <a:rPr lang="ru-RU" sz="2200" dirty="0"/>
+              <a:t> </a:t>
+            </a:r>
+            <a:r>
+              <a:rPr lang="ru-RU" sz="2200" dirty="0" smtClean="0"/>
+              <a:t>    в различных сценариях</a:t>
+            </a:r>
+            <a:r>
+              <a:rPr lang="ru-RU" sz="2200" dirty="0" smtClean="0"/>
+              <a:t>?</a:t>
+            </a:r>
+            <a:endParaRPr lang="ru-RU" sz="2200" dirty="0" smtClean="0"/>
+          </a:p>
+          <a:p>
+            <a:pPr lvl="1">
+              <a:buFont typeface="Wingdings" panose="05000000000000000000" pitchFamily="2" charset="2"/>
+              <a:buChar char="q"/>
+            </a:pPr>
+            <a:endParaRPr lang="ru-RU" sz="2000" dirty="0" smtClean="0"/>
+          </a:p>
+          <a:p>
+            <a:pPr>
+              <a:buFont typeface="Wingdings" panose="05000000000000000000" pitchFamily="2" charset="2"/>
+              <a:buChar char="q"/>
+            </a:pPr>
+            <a:endParaRPr lang="ru-RU" sz="2000" dirty="0"/>
+          </a:p>
+        </p:txBody>
+      </p:sp>
       <p:sp>
         <p:nvSpPr>
           <p:cNvPr id="4" name="Нижний колонтитул 3"/>
@@ -7406,57 +7500,10 @@
           </a:p>
         </p:txBody>
       </p:sp>
-      <p:pic>
-        <p:nvPicPr>
-          <p:cNvPr id="5" name="Рисунок 4"/>
-          <p:cNvPicPr>
-            <a:picLocks noChangeAspect="1"/>
-          </p:cNvPicPr>
-          <p:nvPr/>
-        </p:nvPicPr>
-        <p:blipFill rotWithShape="1">
-          <a:blip r:embed="rId3"/>
-          <a:srcRect b="12551"/>
-          <a:stretch/>
-        </p:blipFill>
-        <p:spPr>
-          <a:xfrm>
-            <a:off x="3068220" y="2214476"/>
-            <a:ext cx="2329052" cy="1345296"/>
-          </a:xfrm>
-          <a:prstGeom prst="rect">
-            <a:avLst/>
-          </a:prstGeom>
-        </p:spPr>
-      </p:pic>
-      <p:pic>
-        <p:nvPicPr>
-          <p:cNvPr id="8" name="Рисунок 7"/>
-          <p:cNvPicPr>
-            <a:picLocks noChangeAspect="1"/>
-          </p:cNvPicPr>
-          <p:nvPr/>
-        </p:nvPicPr>
-        <p:blipFill>
-          <a:blip r:embed="rId4"/>
-          <a:stretch>
-            <a:fillRect/>
-          </a:stretch>
-        </p:blipFill>
-        <p:spPr>
-          <a:xfrm>
-            <a:off x="5319617" y="2235078"/>
-            <a:ext cx="2227240" cy="1369340"/>
-          </a:xfrm>
-          <a:prstGeom prst="rect">
-            <a:avLst/>
-          </a:prstGeom>
-        </p:spPr>
-      </p:pic>
     </p:spTree>
     <p:extLst>
       <p:ext uri="{BB962C8B-B14F-4D97-AF65-F5344CB8AC3E}">
-        <p14:creationId xmlns:p14="http://schemas.microsoft.com/office/powerpoint/2010/main" val="815026918"/>
+        <p14:creationId xmlns:p14="http://schemas.microsoft.com/office/powerpoint/2010/main" val="3756607203"/>
       </p:ext>
     </p:extLst>
   </p:cSld>
@@ -7505,10 +7552,6 @@
           <a:bodyPr/>
           <a:lstStyle/>
           <a:p>
-            <a:r>
-              <a:rPr lang="ru-RU" dirty="0" smtClean="0"/>
-              <a:t>Результаты работы</a:t>
-            </a:r>
             <a:endParaRPr lang="ru-RU" dirty="0"/>
           </a:p>
         </p:txBody>
@@ -7525,8 +7568,8 @@
         </p:nvSpPr>
         <p:spPr>
           <a:xfrm>
-            <a:off x="738909" y="1845734"/>
-            <a:ext cx="11184773" cy="4259502"/>
+            <a:off x="1097279" y="1845734"/>
+            <a:ext cx="10826403" cy="4259502"/>
           </a:xfrm>
         </p:spPr>
         <p:txBody>
@@ -7539,148 +7582,7 @@
               <a:buFont typeface="Wingdings" panose="05000000000000000000" pitchFamily="2" charset="2"/>
               <a:buChar char="q"/>
             </a:pPr>
-            <a:r>
-              <a:rPr lang="ru-RU" sz="2400" dirty="0" smtClean="0"/>
-              <a:t>Проведено </a:t>
-            </a:r>
-            <a:r>
-              <a:rPr lang="ru-RU" sz="2400" dirty="0" smtClean="0"/>
-              <a:t>сравнение </a:t>
-            </a:r>
-            <a:r>
-              <a:rPr lang="ru-RU" sz="2400" dirty="0"/>
-              <a:t>различных алгоритмов </a:t>
-            </a:r>
-            <a:r>
-              <a:rPr lang="ru-RU" sz="2400" dirty="0" smtClean="0"/>
-              <a:t>под </a:t>
-            </a:r>
-            <a:r>
-              <a:rPr lang="ru-RU" sz="2400" dirty="0"/>
-              <a:t>отражение конкретных </a:t>
-            </a:r>
-            <a:r>
-              <a:rPr lang="ru-RU" sz="2400" dirty="0" smtClean="0"/>
-              <a:t>угроз.</a:t>
-            </a:r>
             <a:endParaRPr lang="ru-RU" sz="2400" dirty="0"/>
-          </a:p>
-          <a:p>
-            <a:pPr>
-              <a:buFont typeface="Wingdings" panose="05000000000000000000" pitchFamily="2" charset="2"/>
-              <a:buChar char="q"/>
-            </a:pPr>
-            <a:r>
-              <a:rPr lang="ru-RU" sz="2400" dirty="0"/>
-              <a:t> </a:t>
-            </a:r>
-            <a:r>
-              <a:rPr lang="ru-RU" sz="2400" dirty="0" smtClean="0"/>
-              <a:t>Создана методология </a:t>
-            </a:r>
-            <a:r>
-              <a:rPr lang="ru-RU" sz="2400" dirty="0"/>
-              <a:t>сравнительного тестирования реализаций </a:t>
-            </a:r>
-            <a:r>
-              <a:rPr lang="ru-RU" sz="2400" dirty="0" smtClean="0"/>
-              <a:t>шифров</a:t>
-            </a:r>
-          </a:p>
-          <a:p>
-            <a:pPr marL="201168" lvl="1" indent="0">
-              <a:buNone/>
-            </a:pPr>
-            <a:r>
-              <a:rPr lang="ru-RU" sz="2400" dirty="0"/>
-              <a:t> </a:t>
-            </a:r>
-            <a:r>
-              <a:rPr lang="ru-RU" sz="2400" dirty="0" smtClean="0"/>
-              <a:t> </a:t>
-            </a:r>
-            <a:r>
-              <a:rPr lang="ru-RU" sz="2400" dirty="0" smtClean="0"/>
-              <a:t>на </a:t>
-            </a:r>
-            <a:r>
-              <a:rPr lang="ru-RU" sz="2400" dirty="0" smtClean="0"/>
-              <a:t>пригодность </a:t>
-            </a:r>
-            <a:r>
-              <a:rPr lang="ru-RU" sz="2400" dirty="0"/>
-              <a:t>для устройств </a:t>
-            </a:r>
-            <a:r>
-              <a:rPr lang="en-US" sz="2400" dirty="0" err="1" smtClean="0"/>
-              <a:t>IoT</a:t>
-            </a:r>
-            <a:endParaRPr lang="ru-RU" sz="2400" dirty="0"/>
-          </a:p>
-          <a:p>
-            <a:pPr marL="201168" lvl="1" indent="0">
-              <a:buNone/>
-            </a:pPr>
-            <a:r>
-              <a:rPr lang="ru-RU" sz="2400" dirty="0" smtClean="0"/>
-              <a:t>  </a:t>
-            </a:r>
-            <a:r>
-              <a:rPr lang="ru-RU" sz="2400" dirty="0" smtClean="0"/>
-              <a:t>(</a:t>
-            </a:r>
-            <a:r>
-              <a:rPr lang="ru-RU" sz="2400" dirty="0" smtClean="0"/>
-              <a:t>по параметрам производительности и мощности энергопотребления)</a:t>
-            </a:r>
-            <a:r>
-              <a:rPr lang="en-US" sz="2400" dirty="0" smtClean="0"/>
-              <a:t>.</a:t>
-            </a:r>
-            <a:endParaRPr lang="ru-RU" sz="2400" dirty="0" smtClean="0"/>
-          </a:p>
-          <a:p>
-            <a:pPr>
-              <a:buFont typeface="Wingdings" panose="05000000000000000000" pitchFamily="2" charset="2"/>
-              <a:buChar char="q"/>
-            </a:pPr>
-            <a:r>
-              <a:rPr lang="ru-RU" sz="2400" dirty="0"/>
-              <a:t> </a:t>
-            </a:r>
-            <a:r>
-              <a:rPr lang="ru-RU" sz="2400" dirty="0" smtClean="0"/>
-              <a:t>Методология прошла апробацию на практике, которая доказала ее качество</a:t>
-            </a:r>
-          </a:p>
-          <a:p>
-            <a:pPr marL="201168" lvl="1" indent="0">
-              <a:buNone/>
-            </a:pPr>
-            <a:r>
-              <a:rPr lang="ru-RU" sz="2400" dirty="0" smtClean="0"/>
-              <a:t>  </a:t>
-            </a:r>
-            <a:r>
-              <a:rPr lang="ru-RU" sz="2400" dirty="0" smtClean="0"/>
-              <a:t>(</a:t>
-            </a:r>
-            <a:r>
-              <a:rPr lang="ru-RU" sz="2400" dirty="0" smtClean="0"/>
-              <a:t>в части тестирования производительности</a:t>
-            </a:r>
-            <a:r>
-              <a:rPr lang="ru-RU" sz="2400" dirty="0" smtClean="0"/>
-              <a:t>).</a:t>
-            </a:r>
-            <a:endParaRPr lang="ru-RU" sz="2400" dirty="0" smtClean="0"/>
-          </a:p>
-          <a:p>
-            <a:pPr>
-              <a:buFont typeface="Wingdings" panose="05000000000000000000" pitchFamily="2" charset="2"/>
-              <a:buChar char="q"/>
-            </a:pPr>
-            <a:endParaRPr lang="ru-RU" sz="2000" dirty="0"/>
           </a:p>
         </p:txBody>
       </p:sp>
@@ -7755,7 +7657,7 @@
     </p:spTree>
     <p:extLst>
       <p:ext uri="{BB962C8B-B14F-4D97-AF65-F5344CB8AC3E}">
-        <p14:creationId xmlns:p14="http://schemas.microsoft.com/office/powerpoint/2010/main" val="2409987466"/>
+        <p14:creationId xmlns:p14="http://schemas.microsoft.com/office/powerpoint/2010/main" val="2036226693"/>
       </p:ext>
     </p:extLst>
   </p:cSld>
@@ -7806,7 +7708,11 @@
           <a:p>
             <a:r>
               <a:rPr lang="ru-RU" dirty="0" smtClean="0"/>
-              <a:t>Перспективы развития</a:t>
+              <a:t>Основные использованные </a:t>
+            </a:r>
+            <a:r>
+              <a:rPr lang="ru-RU" dirty="0" smtClean="0"/>
+              <a:t>исследования и материалы</a:t>
             </a:r>
             <a:endParaRPr lang="ru-RU" dirty="0"/>
           </a:p>
@@ -7824,13 +7730,13 @@
         </p:nvSpPr>
         <p:spPr>
           <a:xfrm>
-            <a:off x="738909" y="1845734"/>
-            <a:ext cx="11184773" cy="4259502"/>
+            <a:off x="1097279" y="1845734"/>
+            <a:ext cx="10826403" cy="4259502"/>
           </a:xfrm>
         </p:spPr>
         <p:txBody>
           <a:bodyPr>
-            <a:normAutofit/>
+            <a:normAutofit fontScale="85000" lnSpcReduction="10000"/>
           </a:bodyPr>
           <a:lstStyle/>
           <a:p>
@@ -7840,35 +7746,21 @@
             </a:pPr>
             <a:r>
               <a:rPr lang="ru-RU" sz="2400" dirty="0" smtClean="0"/>
-              <a:t> Практические результаты:</a:t>
-            </a:r>
-          </a:p>
-          <a:p>
-            <a:pPr lvl="1">
-              <a:buFont typeface="Wingdings" panose="05000000000000000000" pitchFamily="2" charset="2"/>
-              <a:buChar char="q"/>
-            </a:pPr>
-            <a:r>
-              <a:rPr lang="ru-RU" sz="2200" dirty="0"/>
               <a:t> </a:t>
             </a:r>
             <a:r>
-              <a:rPr lang="ru-RU" sz="2400" dirty="0" smtClean="0"/>
-              <a:t>Выделены</a:t>
-            </a:r>
-            <a:r>
-              <a:rPr lang="ru-RU" sz="2200" dirty="0" smtClean="0"/>
-              <a:t> перспективные виды алгоритмов для использования на устройствах </a:t>
-            </a:r>
-            <a:r>
-              <a:rPr lang="en-US" sz="2200" dirty="0" err="1" smtClean="0"/>
+              <a:rPr lang="en-US" sz="2400" dirty="0" err="1"/>
               <a:t>IoT</a:t>
             </a:r>
             <a:r>
-              <a:rPr lang="en-US" sz="2200" dirty="0"/>
-              <a:t>.</a:t>
-            </a:r>
-            <a:endParaRPr lang="ru-RU" sz="2200" dirty="0" smtClean="0"/>
+              <a:rPr lang="en-US" sz="2400" dirty="0"/>
+              <a:t> Elements, Layered Architectures and Security Issues: A Comprehensive Survey / M. Burhan [et al.] // Sensors. — </a:t>
+            </a:r>
+            <a:r>
+              <a:rPr lang="en-US" sz="2400" dirty="0" smtClean="0"/>
+              <a:t>2018</a:t>
+            </a:r>
+            <a:endParaRPr lang="ru-RU" sz="2400" dirty="0" smtClean="0"/>
           </a:p>
           <a:p>
             <a:pPr>
@@ -7876,76 +7768,167 @@
               <a:buChar char="q"/>
             </a:pPr>
             <a:r>
-              <a:rPr lang="ru-RU" sz="2400" dirty="0" smtClean="0"/>
-              <a:t> Возникшие </a:t>
-            </a:r>
-            <a:r>
-              <a:rPr lang="ru-RU" sz="2400" dirty="0" smtClean="0"/>
-              <a:t>вопросы для дальнейших исследований:</a:t>
-            </a:r>
-          </a:p>
-          <a:p>
-            <a:pPr lvl="1">
-              <a:buFont typeface="Wingdings" panose="05000000000000000000" pitchFamily="2" charset="2"/>
-              <a:buChar char="q"/>
-            </a:pPr>
-            <a:r>
               <a:rPr lang="ru-RU" sz="2400" dirty="0"/>
               <a:t> </a:t>
             </a:r>
             <a:r>
+              <a:rPr lang="ru-RU" sz="2400" dirty="0"/>
+              <a:t>Жуков А. Е. Легковесная криптография // Вопросы </a:t>
+            </a:r>
+            <a:r>
+              <a:rPr lang="ru-RU" sz="2400" dirty="0" err="1"/>
+              <a:t>кибербезопасности</a:t>
+            </a:r>
+            <a:r>
+              <a:rPr lang="ru-RU" sz="2400" dirty="0"/>
+              <a:t>. — 2015. — № 1. — с. 26—43</a:t>
+            </a:r>
+            <a:r>
               <a:rPr lang="ru-RU" sz="2400" dirty="0" smtClean="0"/>
-              <a:t>Как взаимодействуют процессорные команды?</a:t>
-            </a:r>
-          </a:p>
-          <a:p>
-            <a:pPr lvl="1">
-              <a:buFont typeface="Wingdings" panose="05000000000000000000" pitchFamily="2" charset="2"/>
-              <a:buChar char="q"/>
-            </a:pPr>
-            <a:r>
-              <a:rPr lang="ru-RU" sz="2400" dirty="0"/>
-              <a:t> </a:t>
-            </a:r>
-            <a:r>
-              <a:rPr lang="ru-RU" sz="2400" dirty="0" smtClean="0"/>
-              <a:t>Насколько хорошо работает </a:t>
-            </a:r>
-            <a:r>
-              <a:rPr lang="ru-RU" sz="2400" dirty="0" err="1" smtClean="0"/>
-              <a:t>внутрипроцессорная</a:t>
-            </a:r>
-            <a:r>
-              <a:rPr lang="ru-RU" sz="2400" dirty="0" smtClean="0"/>
-              <a:t> оптимизация и параллелизм</a:t>
-            </a:r>
-          </a:p>
-          <a:p>
-            <a:pPr marL="201168" lvl="1" indent="0">
-              <a:buNone/>
-            </a:pPr>
-            <a:r>
-              <a:rPr lang="ru-RU" sz="2400" dirty="0"/>
-              <a:t> </a:t>
-            </a:r>
-            <a:r>
-              <a:rPr lang="ru-RU" sz="2400" dirty="0" smtClean="0"/>
-              <a:t>    в различных сценариях?</a:t>
-            </a:r>
-          </a:p>
-          <a:p>
-            <a:pPr lvl="1">
-              <a:buFont typeface="Wingdings" panose="05000000000000000000" pitchFamily="2" charset="2"/>
-              <a:buChar char="q"/>
-            </a:pPr>
-            <a:endParaRPr lang="ru-RU" sz="2000" dirty="0" smtClean="0"/>
+              <a:t>.</a:t>
+            </a:r>
           </a:p>
           <a:p>
             <a:pPr>
               <a:buFont typeface="Wingdings" panose="05000000000000000000" pitchFamily="2" charset="2"/>
               <a:buChar char="q"/>
             </a:pPr>
-            <a:endParaRPr lang="ru-RU" sz="2000" dirty="0"/>
+            <a:r>
+              <a:rPr lang="ru-RU" sz="2400" dirty="0"/>
+              <a:t> </a:t>
+            </a:r>
+            <a:r>
+              <a:rPr lang="en-US" sz="2400" dirty="0"/>
+              <a:t>A review of lightweight block ciphers / G. </a:t>
+            </a:r>
+            <a:r>
+              <a:rPr lang="en-US" sz="2400" dirty="0" err="1"/>
+              <a:t>Hatzivasilis</a:t>
+            </a:r>
+            <a:r>
+              <a:rPr lang="en-US" sz="2400" dirty="0"/>
+              <a:t> [et al.] // Journal of Cryptographic Engineering. — 2017. — Vol. 8. — P. 1–44. — DOI 10.1007/s13389- 017-0160-y</a:t>
+            </a:r>
+            <a:r>
+              <a:rPr lang="en-US" sz="2400" dirty="0" smtClean="0"/>
+              <a:t>.</a:t>
+            </a:r>
+            <a:endParaRPr lang="ru-RU" sz="2400" dirty="0" smtClean="0"/>
+          </a:p>
+          <a:p>
+            <a:pPr>
+              <a:buFont typeface="Wingdings" panose="05000000000000000000" pitchFamily="2" charset="2"/>
+              <a:buChar char="q"/>
+            </a:pPr>
+            <a:r>
+              <a:rPr lang="ru-RU" sz="2400" dirty="0" smtClean="0"/>
+              <a:t>Ханкин </a:t>
+            </a:r>
+            <a:r>
+              <a:rPr lang="ru-RU" sz="2400" dirty="0"/>
+              <a:t>К. М. О методе оценки соответствия </a:t>
+            </a:r>
+            <a:r>
+              <a:rPr lang="ru-RU" sz="2400" dirty="0" err="1"/>
+              <a:t>энергозатратности</a:t>
+            </a:r>
+            <a:r>
+              <a:rPr lang="ru-RU" sz="2400" dirty="0"/>
+              <a:t> вычислительной задачи требованиям к энергопотреблению и его реализации с помощью </a:t>
+            </a:r>
+            <a:r>
+              <a:rPr lang="ru-RU" sz="2400" dirty="0" err="1"/>
+              <a:t>StarPU</a:t>
+            </a:r>
+            <a:r>
+              <a:rPr lang="ru-RU" sz="2400" dirty="0"/>
+              <a:t> // Вестник </a:t>
+            </a:r>
+            <a:r>
+              <a:rPr lang="ru-RU" sz="2400" dirty="0" err="1"/>
+              <a:t>ЮУрГУ</a:t>
+            </a:r>
+            <a:r>
+              <a:rPr lang="ru-RU" sz="2400" dirty="0"/>
+              <a:t>. Серия: Компьютерные технологии, управление, радиоэлектроника. — 2013. — № 1. — с. 84—86</a:t>
+            </a:r>
+            <a:r>
+              <a:rPr lang="ru-RU" sz="2400" dirty="0" smtClean="0"/>
+              <a:t>.</a:t>
+            </a:r>
+          </a:p>
+          <a:p>
+            <a:pPr>
+              <a:buFont typeface="Wingdings" panose="05000000000000000000" pitchFamily="2" charset="2"/>
+              <a:buChar char="q"/>
+            </a:pPr>
+            <a:r>
+              <a:rPr lang="ru-RU" sz="2400" dirty="0"/>
+              <a:t> </a:t>
+            </a:r>
+            <a:r>
+              <a:rPr lang="en-US" sz="2400" dirty="0" err="1"/>
+              <a:t>Github</a:t>
+            </a:r>
+            <a:r>
+              <a:rPr lang="en-US" sz="2400" dirty="0"/>
+              <a:t> - C program for AES. — URL: https://github.com/devershichandra27/ C-implementation-of-AES (visited on 10.06.2020</a:t>
+            </a:r>
+            <a:r>
+              <a:rPr lang="en-US" sz="2400" dirty="0" smtClean="0"/>
+              <a:t>).</a:t>
+            </a:r>
+          </a:p>
+          <a:p>
+            <a:pPr>
+              <a:buFont typeface="Wingdings" panose="05000000000000000000" pitchFamily="2" charset="2"/>
+              <a:buChar char="q"/>
+            </a:pPr>
+            <a:r>
+              <a:rPr lang="en-US" sz="2400" dirty="0"/>
+              <a:t> </a:t>
+            </a:r>
+            <a:r>
+              <a:rPr lang="en-US" sz="2400" dirty="0" err="1"/>
+              <a:t>Github</a:t>
+            </a:r>
+            <a:r>
+              <a:rPr lang="en-US" sz="2400" dirty="0"/>
+              <a:t> - Crypto Implementations - </a:t>
+            </a:r>
+            <a:r>
+              <a:rPr lang="en-US" sz="2400" dirty="0" err="1"/>
+              <a:t>aes.c</a:t>
+            </a:r>
+            <a:r>
+              <a:rPr lang="en-US" sz="2400" dirty="0"/>
+              <a:t>. — URL: https:// </a:t>
+            </a:r>
+            <a:r>
+              <a:rPr lang="en-US" sz="2400" dirty="0" err="1"/>
+              <a:t>github</a:t>
+            </a:r>
+            <a:r>
+              <a:rPr lang="en-US" sz="2400" dirty="0"/>
+              <a:t>. com/ </a:t>
+            </a:r>
+            <a:r>
+              <a:rPr lang="en-US" sz="2400" dirty="0" err="1"/>
+              <a:t>chrishulbert</a:t>
+            </a:r>
+            <a:r>
+              <a:rPr lang="en-US" sz="2400" dirty="0"/>
+              <a:t>/crypto/blob/master/c/</a:t>
+            </a:r>
+            <a:r>
+              <a:rPr lang="en-US" sz="2400" dirty="0" err="1"/>
+              <a:t>c_aes.c</a:t>
+            </a:r>
+            <a:r>
+              <a:rPr lang="en-US" sz="2400" dirty="0"/>
+              <a:t> (visited on 10.06.2020).</a:t>
+            </a:r>
+            <a:endParaRPr lang="ru-RU" sz="2400" dirty="0"/>
           </a:p>
         </p:txBody>
       </p:sp>
@@ -8020,7 +8003,443 @@
     </p:spTree>
     <p:extLst>
       <p:ext uri="{BB962C8B-B14F-4D97-AF65-F5344CB8AC3E}">
-        <p14:creationId xmlns:p14="http://schemas.microsoft.com/office/powerpoint/2010/main" val="3756607203"/>
+        <p14:creationId xmlns:p14="http://schemas.microsoft.com/office/powerpoint/2010/main" val="2875661845"/>
+      </p:ext>
+    </p:extLst>
+  </p:cSld>
+  <p:clrMapOvr>
+    <a:masterClrMapping/>
+  </p:clrMapOvr>
+  <p:timing>
+    <p:tnLst>
+      <p:par>
+        <p:cTn id="1" dur="indefinite" restart="never" nodeType="tmRoot"/>
+      </p:par>
+    </p:tnLst>
+  </p:timing>
+</p:sld>
+</file>
+
+<file path=ppt/slides/slide19.xml><?xml version="1.0" encoding="utf-8"?>
+<p:sld xmlns:a="http://schemas.openxmlformats.org/drawingml/2006/main" xmlns:r="http://schemas.openxmlformats.org/officeDocument/2006/relationships" xmlns:p="http://schemas.openxmlformats.org/presentationml/2006/main">
+  <p:cSld>
+    <p:spTree>
+      <p:nvGrpSpPr>
+        <p:cNvPr id="1" name=""/>
+        <p:cNvGrpSpPr/>
+        <p:nvPr/>
+      </p:nvGrpSpPr>
+      <p:grpSpPr>
+        <a:xfrm>
+          <a:off x="0" y="0"/>
+          <a:ext cx="0" cy="0"/>
+          <a:chOff x="0" y="0"/>
+          <a:chExt cx="0" cy="0"/>
+        </a:xfrm>
+      </p:grpSpPr>
+      <p:sp>
+        <p:nvSpPr>
+          <p:cNvPr id="2" name="Заголовок 1"/>
+          <p:cNvSpPr>
+            <a:spLocks noGrp="1"/>
+          </p:cNvSpPr>
+          <p:nvPr>
+            <p:ph type="title"/>
+          </p:nvPr>
+        </p:nvSpPr>
+        <p:spPr/>
+        <p:txBody>
+          <a:bodyPr/>
+          <a:lstStyle/>
+          <a:p>
+            <a:r>
+              <a:rPr lang="ru-RU" dirty="0" smtClean="0"/>
+              <a:t>Уровни</a:t>
+            </a:r>
+            <a:r>
+              <a:rPr lang="en-US" dirty="0" smtClean="0"/>
+              <a:t> </a:t>
+            </a:r>
+            <a:r>
+              <a:rPr lang="ru-RU" dirty="0" smtClean="0"/>
+              <a:t>системы</a:t>
+            </a:r>
+            <a:r>
+              <a:rPr lang="en-US" dirty="0" smtClean="0"/>
+              <a:t> </a:t>
+            </a:r>
+            <a:r>
+              <a:rPr lang="en-US" dirty="0" err="1" smtClean="0"/>
+              <a:t>IoT</a:t>
+            </a:r>
+            <a:r>
+              <a:rPr lang="ru-RU" dirty="0" smtClean="0"/>
+              <a:t> </a:t>
+            </a:r>
+            <a:endParaRPr lang="ru-RU" dirty="0"/>
+          </a:p>
+        </p:txBody>
+      </p:sp>
+      <p:sp>
+        <p:nvSpPr>
+          <p:cNvPr id="3" name="Объект 2"/>
+          <p:cNvSpPr>
+            <a:spLocks noGrp="1"/>
+          </p:cNvSpPr>
+          <p:nvPr>
+            <p:ph idx="1"/>
+          </p:nvPr>
+        </p:nvSpPr>
+        <p:spPr>
+          <a:xfrm>
+            <a:off x="1097279" y="1845734"/>
+            <a:ext cx="10826403" cy="4259502"/>
+          </a:xfrm>
+        </p:spPr>
+        <p:txBody>
+          <a:bodyPr>
+            <a:normAutofit/>
+          </a:bodyPr>
+          <a:lstStyle/>
+          <a:p>
+            <a:pPr>
+              <a:spcAft>
+                <a:spcPts val="1800"/>
+              </a:spcAft>
+              <a:buFont typeface="Wingdings" panose="05000000000000000000" pitchFamily="2" charset="2"/>
+              <a:buChar char="q"/>
+            </a:pPr>
+            <a:r>
+              <a:rPr lang="en-US" sz="2400" dirty="0"/>
+              <a:t> </a:t>
+            </a:r>
+            <a:r>
+              <a:rPr lang="ru-RU" sz="2400" dirty="0"/>
+              <a:t>У</a:t>
+            </a:r>
+            <a:r>
+              <a:rPr lang="ru-RU" sz="2400" dirty="0" smtClean="0"/>
+              <a:t>ровень бизнес-логики</a:t>
+            </a:r>
+            <a:endParaRPr lang="en-US" sz="2400" dirty="0" smtClean="0"/>
+          </a:p>
+          <a:p>
+            <a:pPr>
+              <a:spcAft>
+                <a:spcPts val="1800"/>
+              </a:spcAft>
+              <a:buFont typeface="Wingdings" panose="05000000000000000000" pitchFamily="2" charset="2"/>
+              <a:buChar char="q"/>
+            </a:pPr>
+            <a:r>
+              <a:rPr lang="en-US" sz="2400" dirty="0"/>
+              <a:t> </a:t>
+            </a:r>
+            <a:r>
+              <a:rPr lang="ru-RU" sz="2400" dirty="0"/>
+              <a:t>П</a:t>
+            </a:r>
+            <a:r>
+              <a:rPr lang="ru-RU" sz="2400" dirty="0" smtClean="0"/>
+              <a:t>рикладной уровень</a:t>
+            </a:r>
+            <a:endParaRPr lang="en-US" sz="2400" dirty="0" smtClean="0"/>
+          </a:p>
+          <a:p>
+            <a:pPr>
+              <a:spcAft>
+                <a:spcPts val="1800"/>
+              </a:spcAft>
+              <a:buFont typeface="Wingdings" panose="05000000000000000000" pitchFamily="2" charset="2"/>
+              <a:buChar char="q"/>
+            </a:pPr>
+            <a:r>
+              <a:rPr lang="en-US" sz="2400" dirty="0"/>
+              <a:t> </a:t>
+            </a:r>
+            <a:r>
+              <a:rPr lang="ru-RU" sz="2400" dirty="0"/>
+              <a:t>У</a:t>
+            </a:r>
+            <a:r>
+              <a:rPr lang="ru-RU" sz="2400" dirty="0" smtClean="0"/>
+              <a:t>ровень обработки</a:t>
+            </a:r>
+            <a:endParaRPr lang="en-US" sz="2400" dirty="0" smtClean="0"/>
+          </a:p>
+          <a:p>
+            <a:pPr>
+              <a:spcAft>
+                <a:spcPts val="1800"/>
+              </a:spcAft>
+              <a:buFont typeface="Wingdings" panose="05000000000000000000" pitchFamily="2" charset="2"/>
+              <a:buChar char="q"/>
+            </a:pPr>
+            <a:r>
+              <a:rPr lang="en-US" sz="2400" dirty="0"/>
+              <a:t> </a:t>
+            </a:r>
+            <a:r>
+              <a:rPr lang="ru-RU" sz="2400" dirty="0"/>
+              <a:t>Т</a:t>
+            </a:r>
+            <a:r>
+              <a:rPr lang="ru-RU" sz="2400" dirty="0" smtClean="0"/>
+              <a:t>ранспортный уровень</a:t>
+            </a:r>
+            <a:endParaRPr lang="en-US" sz="2400" dirty="0" smtClean="0"/>
+          </a:p>
+          <a:p>
+            <a:pPr>
+              <a:spcAft>
+                <a:spcPts val="1800"/>
+              </a:spcAft>
+              <a:buFont typeface="Wingdings" panose="05000000000000000000" pitchFamily="2" charset="2"/>
+              <a:buChar char="q"/>
+            </a:pPr>
+            <a:r>
+              <a:rPr lang="en-US" sz="2400" dirty="0"/>
+              <a:t> </a:t>
+            </a:r>
+            <a:r>
+              <a:rPr lang="ru-RU" sz="2400" dirty="0"/>
+              <a:t>С</a:t>
+            </a:r>
+            <a:r>
+              <a:rPr lang="ru-RU" sz="2400" dirty="0" smtClean="0"/>
+              <a:t>енсорный </a:t>
+            </a:r>
+            <a:r>
+              <a:rPr lang="ru-RU" sz="2400" dirty="0" smtClean="0"/>
+              <a:t>уровень                                                     </a:t>
+            </a:r>
+            <a:r>
+              <a:rPr lang="en-US" sz="2400" dirty="0" smtClean="0"/>
+              <a:t> </a:t>
+            </a:r>
+            <a:r>
+              <a:rPr lang="en-US" sz="2400" dirty="0" smtClean="0">
+                <a:sym typeface="Wingdings" panose="05000000000000000000" pitchFamily="2" charset="2"/>
+              </a:rPr>
+              <a:t> </a:t>
+            </a:r>
+            <a:r>
+              <a:rPr lang="ru-RU" sz="2400" dirty="0" smtClean="0">
+                <a:sym typeface="Wingdings" panose="05000000000000000000" pitchFamily="2" charset="2"/>
+              </a:rPr>
+              <a:t>Устройства </a:t>
+            </a:r>
+            <a:r>
+              <a:rPr lang="en-US" sz="2400" dirty="0" err="1" smtClean="0">
+                <a:sym typeface="Wingdings" panose="05000000000000000000" pitchFamily="2" charset="2"/>
+              </a:rPr>
+              <a:t>IoT</a:t>
+            </a:r>
+            <a:r>
+              <a:rPr lang="en-US" sz="2400" dirty="0" smtClean="0">
+                <a:sym typeface="Wingdings" panose="05000000000000000000" pitchFamily="2" charset="2"/>
+              </a:rPr>
+              <a:t> - </a:t>
+            </a:r>
+            <a:r>
+              <a:rPr lang="ru-RU" sz="2400" dirty="0" smtClean="0">
+                <a:sym typeface="Wingdings" panose="05000000000000000000" pitchFamily="2" charset="2"/>
+              </a:rPr>
+              <a:t>здесь</a:t>
+            </a:r>
+            <a:endParaRPr lang="ru-RU" sz="2400" dirty="0" smtClean="0"/>
+          </a:p>
+          <a:p>
+            <a:pPr>
+              <a:spcAft>
+                <a:spcPts val="1800"/>
+              </a:spcAft>
+              <a:buFont typeface="Wingdings" panose="05000000000000000000" pitchFamily="2" charset="2"/>
+              <a:buChar char="q"/>
+            </a:pPr>
+            <a:endParaRPr lang="ru-RU" sz="2400" dirty="0"/>
+          </a:p>
+        </p:txBody>
+      </p:sp>
+      <p:sp>
+        <p:nvSpPr>
+          <p:cNvPr id="4" name="Нижний колонтитул 3"/>
+          <p:cNvSpPr>
+            <a:spLocks noGrp="1"/>
+          </p:cNvSpPr>
+          <p:nvPr>
+            <p:ph type="ftr" sz="quarter" idx="11"/>
+          </p:nvPr>
+        </p:nvSpPr>
+        <p:spPr>
+          <a:xfrm>
+            <a:off x="0" y="6410036"/>
+            <a:ext cx="12302836" cy="447964"/>
+          </a:xfrm>
+        </p:spPr>
+        <p:txBody>
+          <a:bodyPr/>
+          <a:lstStyle/>
+          <a:p>
+            <a:r>
+              <a:rPr lang="ru-RU" sz="2000" dirty="0" smtClean="0"/>
+              <a:t>СРАВНИТЕЛЬНЫЙ АНАЛИЗ АЛГОРИТМОВ ЛЕГКОВЕСНОЙ КРИПТОГРАФИИ ДЛЯ УСТРОЙСТВ ИНТЕРНЕТА </a:t>
+            </a:r>
+            <a:r>
+              <a:rPr lang="ru-RU" sz="2000" dirty="0" err="1" smtClean="0"/>
+              <a:t>ВЕЩЕй</a:t>
+            </a:r>
+            <a:endParaRPr lang="ru-RU" sz="2000" dirty="0"/>
+          </a:p>
+        </p:txBody>
+      </p:sp>
+      <p:sp>
+        <p:nvSpPr>
+          <p:cNvPr id="7" name="Номер слайда 6"/>
+          <p:cNvSpPr>
+            <a:spLocks noGrp="1"/>
+          </p:cNvSpPr>
+          <p:nvPr>
+            <p:ph type="sldNum" sz="quarter" idx="12"/>
+          </p:nvPr>
+        </p:nvSpPr>
+        <p:spPr>
+          <a:xfrm>
+            <a:off x="10611658" y="516948"/>
+            <a:ext cx="1312025" cy="365125"/>
+          </a:xfrm>
+        </p:spPr>
+        <p:txBody>
+          <a:bodyPr/>
+          <a:lstStyle/>
+          <a:p>
+            <a:fld id="{C8E71B65-08E1-4CE1-BD4B-D1F08213E75D}" type="slidenum">
+              <a:rPr lang="ru-RU" sz="3600" smtClean="0">
+                <a:solidFill>
+                  <a:schemeClr val="tx1"/>
+                </a:solidFill>
+              </a:rPr>
+              <a:t>19</a:t>
+            </a:fld>
+            <a:endParaRPr lang="ru-RU" sz="2400" dirty="0">
+              <a:solidFill>
+                <a:schemeClr val="tx1"/>
+              </a:solidFill>
+            </a:endParaRPr>
+          </a:p>
+        </p:txBody>
+      </p:sp>
+      <p:pic>
+        <p:nvPicPr>
+          <p:cNvPr id="5" name="Рисунок 4"/>
+          <p:cNvPicPr>
+            <a:picLocks noChangeAspect="1"/>
+          </p:cNvPicPr>
+          <p:nvPr/>
+        </p:nvPicPr>
+        <p:blipFill rotWithShape="1">
+          <a:blip r:embed="rId2"/>
+          <a:srcRect t="1205"/>
+          <a:stretch/>
+        </p:blipFill>
+        <p:spPr>
+          <a:xfrm>
+            <a:off x="4799795" y="1780673"/>
+            <a:ext cx="2703246" cy="3479665"/>
+          </a:xfrm>
+          <a:prstGeom prst="rect">
+            <a:avLst/>
+          </a:prstGeom>
+        </p:spPr>
+      </p:pic>
+      <p:sp>
+        <p:nvSpPr>
+          <p:cNvPr id="6" name="TextBox 5"/>
+          <p:cNvSpPr txBox="1"/>
+          <p:nvPr/>
+        </p:nvSpPr>
+        <p:spPr>
+          <a:xfrm>
+            <a:off x="4726003" y="5246967"/>
+            <a:ext cx="6256421" cy="1200329"/>
+          </a:xfrm>
+          <a:prstGeom prst="rect">
+            <a:avLst/>
+          </a:prstGeom>
+          <a:noFill/>
+        </p:spPr>
+        <p:txBody>
+          <a:bodyPr wrap="square" rtlCol="0">
+            <a:spAutoFit/>
+          </a:bodyPr>
+          <a:lstStyle/>
+          <a:p>
+            <a:r>
+              <a:rPr lang="ru-RU" dirty="0" smtClean="0"/>
+              <a:t>Изображение </a:t>
+            </a:r>
+            <a:r>
+              <a:rPr lang="ru-RU" dirty="0"/>
+              <a:t>взято из </a:t>
+            </a:r>
+            <a:r>
+              <a:rPr lang="ru-RU" dirty="0" smtClean="0"/>
+              <a:t>статьи</a:t>
+            </a:r>
+          </a:p>
+          <a:p>
+            <a:r>
+              <a:rPr lang="ru-RU" dirty="0" smtClean="0"/>
+              <a:t>«</a:t>
+            </a:r>
+            <a:r>
+              <a:rPr lang="en-US" dirty="0" smtClean="0"/>
+              <a:t>Internet of Things: Architectures, Protocols, and Applications</a:t>
+            </a:r>
+            <a:r>
+              <a:rPr lang="ru-RU" dirty="0" smtClean="0"/>
+              <a:t>»</a:t>
+            </a:r>
+          </a:p>
+          <a:p>
+            <a:r>
+              <a:rPr lang="en-US" dirty="0" smtClean="0"/>
+              <a:t>by </a:t>
+            </a:r>
+            <a:r>
+              <a:rPr lang="en-US" dirty="0" err="1" smtClean="0"/>
+              <a:t>Pallavi</a:t>
+            </a:r>
+            <a:r>
+              <a:rPr lang="en-US" dirty="0" smtClean="0"/>
+              <a:t> </a:t>
+            </a:r>
+            <a:r>
+              <a:rPr lang="en-US" dirty="0" err="1" smtClean="0"/>
+              <a:t>Sethi</a:t>
+            </a:r>
+            <a:r>
+              <a:rPr lang="en-US" dirty="0" smtClean="0"/>
+              <a:t>, </a:t>
+            </a:r>
+            <a:r>
+              <a:rPr lang="en-US" dirty="0" err="1" smtClean="0"/>
+              <a:t>Smruti</a:t>
+            </a:r>
+            <a:r>
+              <a:rPr lang="en-US" dirty="0" smtClean="0"/>
+              <a:t> R. Sarangi</a:t>
+            </a:r>
+          </a:p>
+          <a:p>
+            <a:endParaRPr lang="ru-RU" dirty="0"/>
+          </a:p>
+        </p:txBody>
+      </p:sp>
+    </p:spTree>
+    <p:extLst>
+      <p:ext uri="{BB962C8B-B14F-4D97-AF65-F5344CB8AC3E}">
+        <p14:creationId xmlns:p14="http://schemas.microsoft.com/office/powerpoint/2010/main" val="454217343"/>
       </p:ext>
     </p:extLst>
   </p:cSld>
@@ -8153,7 +8572,11 @@
             </a:pPr>
             <a:r>
               <a:rPr lang="ru-RU" sz="2600" dirty="0" smtClean="0"/>
-              <a:t>(20% приоритета ВКР).</a:t>
+              <a:t>(10</a:t>
+            </a:r>
+            <a:r>
+              <a:rPr lang="ru-RU" sz="2600" dirty="0" smtClean="0"/>
+              <a:t>% приоритета ВКР).</a:t>
             </a:r>
           </a:p>
           <a:p>
@@ -8176,7 +8599,11 @@
             </a:pPr>
             <a:r>
               <a:rPr lang="ru-RU" sz="2600" dirty="0" smtClean="0"/>
-              <a:t>(80% приоритета ВКР).</a:t>
+              <a:t>(90</a:t>
+            </a:r>
+            <a:r>
+              <a:rPr lang="ru-RU" sz="2600" dirty="0" smtClean="0"/>
+              <a:t>% приоритета ВКР).</a:t>
             </a:r>
             <a:endParaRPr lang="ru-RU" sz="2600" dirty="0"/>
           </a:p>
@@ -8595,7 +9022,15 @@
             </a:pPr>
             <a:r>
               <a:rPr lang="ru-RU" sz="2400" dirty="0" smtClean="0"/>
-              <a:t> Сравнение различных алгоритмов (под отражение конкретных угроз).</a:t>
+              <a:t> Сравнение различных алгоритмов </a:t>
+            </a:r>
+            <a:r>
+              <a:rPr lang="ru-RU" sz="2400" dirty="0" smtClean="0"/>
+              <a:t>(для отражения </a:t>
+            </a:r>
+            <a:r>
+              <a:rPr lang="ru-RU" sz="2400" dirty="0" smtClean="0"/>
+              <a:t>конкретных угроз).</a:t>
             </a:r>
           </a:p>
           <a:p>
@@ -8773,7 +9208,7 @@
           <a:p>
             <a:r>
               <a:rPr lang="ru-RU" dirty="0" smtClean="0"/>
-              <a:t>Основные использованные исследования</a:t>
+              <a:t>Критерии сравнения шифров (практический аспект)</a:t>
             </a:r>
             <a:endParaRPr lang="ru-RU" dirty="0"/>
           </a:p>
@@ -8805,7 +9240,125 @@
               <a:buFont typeface="Wingdings" panose="05000000000000000000" pitchFamily="2" charset="2"/>
               <a:buChar char="q"/>
             </a:pPr>
-            <a:endParaRPr lang="ru-RU" sz="2400" dirty="0"/>
+            <a:r>
+              <a:rPr lang="ru-RU" sz="2400" dirty="0"/>
+              <a:t> </a:t>
+            </a:r>
+            <a:r>
+              <a:rPr lang="ru-RU" sz="2400" dirty="0" smtClean="0"/>
+              <a:t>Сложность взлома </a:t>
+            </a:r>
+            <a:r>
+              <a:rPr lang="ru-RU" sz="2400" dirty="0" smtClean="0"/>
+              <a:t>(основное </a:t>
+            </a:r>
+            <a:r>
+              <a:rPr lang="ru-RU" sz="2400" dirty="0" smtClean="0"/>
+              <a:t>свойство шифра).</a:t>
+            </a:r>
+          </a:p>
+          <a:p>
+            <a:pPr>
+              <a:buFont typeface="Wingdings" panose="05000000000000000000" pitchFamily="2" charset="2"/>
+              <a:buChar char="q"/>
+            </a:pPr>
+            <a:r>
+              <a:rPr lang="ru-RU" sz="2400" dirty="0"/>
+              <a:t> </a:t>
+            </a:r>
+            <a:r>
+              <a:rPr lang="ru-RU" sz="2400" dirty="0" smtClean="0"/>
+              <a:t>Аппаратные </a:t>
+            </a:r>
+            <a:r>
+              <a:rPr lang="ru-RU" sz="2400" dirty="0" smtClean="0"/>
+              <a:t>ограничения, влияющие на работу шифрующей программы:</a:t>
+            </a:r>
+            <a:endParaRPr lang="ru-RU" sz="2400" dirty="0" smtClean="0"/>
+          </a:p>
+          <a:p>
+            <a:pPr lvl="1">
+              <a:buFont typeface="Wingdings" panose="05000000000000000000" pitchFamily="2" charset="2"/>
+              <a:buChar char="q"/>
+            </a:pPr>
+            <a:r>
+              <a:rPr lang="ru-RU" sz="2200" dirty="0"/>
+              <a:t> </a:t>
+            </a:r>
+            <a:r>
+              <a:rPr lang="ru-RU" sz="2200" dirty="0" smtClean="0"/>
+              <a:t>Энергетические </a:t>
+            </a:r>
+            <a:r>
+              <a:rPr lang="ru-RU" sz="2200" dirty="0" smtClean="0"/>
+              <a:t>ресурсы.</a:t>
+            </a:r>
+            <a:endParaRPr lang="ru-RU" sz="2200" dirty="0" smtClean="0"/>
+          </a:p>
+          <a:p>
+            <a:pPr lvl="1">
+              <a:buFont typeface="Wingdings" panose="05000000000000000000" pitchFamily="2" charset="2"/>
+              <a:buChar char="q"/>
+            </a:pPr>
+            <a:r>
+              <a:rPr lang="ru-RU" sz="2200" dirty="0"/>
+              <a:t> </a:t>
+            </a:r>
+            <a:r>
+              <a:rPr lang="ru-RU" sz="2200" dirty="0" smtClean="0"/>
+              <a:t>Объем </a:t>
+            </a:r>
+            <a:r>
+              <a:rPr lang="ru-RU" sz="2200" dirty="0" smtClean="0"/>
+              <a:t>ОЗУ/стека (код и данные).</a:t>
+            </a:r>
+            <a:endParaRPr lang="ru-RU" sz="2200" dirty="0" smtClean="0"/>
+          </a:p>
+          <a:p>
+            <a:pPr lvl="1">
+              <a:buFont typeface="Wingdings" panose="05000000000000000000" pitchFamily="2" charset="2"/>
+              <a:buChar char="q"/>
+            </a:pPr>
+            <a:r>
+              <a:rPr lang="ru-RU" sz="2200" dirty="0" smtClean="0"/>
+              <a:t> Размер </a:t>
+            </a:r>
+            <a:r>
+              <a:rPr lang="ru-RU" sz="2200" dirty="0" smtClean="0"/>
+              <a:t>микросхемы (</a:t>
+            </a:r>
+            <a:r>
+              <a:rPr lang="en-US" sz="2200" dirty="0" smtClean="0"/>
+              <a:t>GE)</a:t>
+            </a:r>
+            <a:r>
+              <a:rPr lang="ru-RU" sz="2200" dirty="0" smtClean="0"/>
+              <a:t> – определяется только на </a:t>
+            </a:r>
+            <a:r>
+              <a:rPr lang="ru-RU" sz="2200" dirty="0" smtClean="0"/>
+              <a:t>стенде.</a:t>
+            </a:r>
+            <a:endParaRPr lang="ru-RU" sz="2200" dirty="0"/>
+          </a:p>
+          <a:p>
+            <a:pPr lvl="1">
+              <a:buFont typeface="Wingdings" panose="05000000000000000000" pitchFamily="2" charset="2"/>
+              <a:buChar char="q"/>
+            </a:pPr>
+            <a:r>
+              <a:rPr lang="ru-RU" sz="2200" dirty="0" smtClean="0"/>
+              <a:t> Производительность </a:t>
+            </a:r>
+            <a:r>
+              <a:rPr lang="ru-RU" sz="2200" dirty="0"/>
+              <a:t>– будем тестировать</a:t>
+            </a:r>
+            <a:r>
+              <a:rPr lang="ru-RU" sz="2400" dirty="0" smtClean="0"/>
+              <a:t>.</a:t>
+            </a:r>
+            <a:endParaRPr lang="ru-RU" sz="2200" dirty="0"/>
           </a:p>
         </p:txBody>
       </p:sp>
@@ -8880,7 +9433,7 @@
     </p:spTree>
     <p:extLst>
       <p:ext uri="{BB962C8B-B14F-4D97-AF65-F5344CB8AC3E}">
-        <p14:creationId xmlns:p14="http://schemas.microsoft.com/office/powerpoint/2010/main" val="2036226693"/>
+        <p14:creationId xmlns:p14="http://schemas.microsoft.com/office/powerpoint/2010/main" val="1293842083"/>
       </p:ext>
     </p:extLst>
   </p:cSld>
@@ -8931,7 +9484,19 @@
           <a:p>
             <a:r>
               <a:rPr lang="ru-RU" dirty="0" smtClean="0"/>
-              <a:t>Критерии сравнения шифров (практический аспект)</a:t>
+              <a:t>Угрозы безопасности сенсорного уровня </a:t>
+            </a:r>
+            <a:r>
+              <a:rPr lang="ru-RU" dirty="0" smtClean="0"/>
+              <a:t>и </a:t>
+            </a:r>
+            <a:r>
+              <a:rPr lang="ru-RU" dirty="0" smtClean="0"/>
+              <a:t>как </a:t>
+            </a:r>
+            <a:r>
+              <a:rPr lang="ru-RU" dirty="0" smtClean="0"/>
+              <a:t>их отразить</a:t>
             </a:r>
             <a:endParaRPr lang="ru-RU" dirty="0"/>
           </a:p>
@@ -8965,8 +9530,13 @@
             </a:pPr>
             <a:r>
               <a:rPr lang="ru-RU" sz="2400" dirty="0" smtClean="0"/>
-              <a:t> Способность отражать различные угрозы (основное свойство шифра).</a:t>
-            </a:r>
+              <a:t> Подслушивание – </a:t>
+            </a:r>
+            <a:r>
+              <a:rPr lang="ru-RU" sz="2400" dirty="0" smtClean="0"/>
+              <a:t>гарантировать конфиденциальность</a:t>
+            </a:r>
+            <a:endParaRPr lang="ru-RU" sz="2400" dirty="0" smtClean="0"/>
           </a:p>
           <a:p>
             <a:pPr>
@@ -8974,58 +9544,12 @@
               <a:buChar char="q"/>
             </a:pPr>
             <a:r>
+              <a:rPr lang="ru-RU" sz="2400" dirty="0" smtClean="0"/>
+              <a:t> Фальшивый </a:t>
+            </a:r>
+            <a:r>
               <a:rPr lang="ru-RU" sz="2400" dirty="0"/>
-              <a:t> </a:t>
-            </a:r>
-            <a:r>
-              <a:rPr lang="ru-RU" sz="2400" dirty="0" smtClean="0"/>
-              <a:t>Аппаратные ограничения:</a:t>
-            </a:r>
-          </a:p>
-          <a:p>
-            <a:pPr lvl="1">
-              <a:buFont typeface="Wingdings" panose="05000000000000000000" pitchFamily="2" charset="2"/>
-              <a:buChar char="q"/>
-            </a:pPr>
-            <a:r>
-              <a:rPr lang="ru-RU" sz="2200" dirty="0"/>
-              <a:t> </a:t>
-            </a:r>
-            <a:r>
-              <a:rPr lang="ru-RU" sz="2200" dirty="0" smtClean="0"/>
-              <a:t>Энергетические ресурсы – будем тестировать.</a:t>
-            </a:r>
-          </a:p>
-          <a:p>
-            <a:pPr lvl="1">
-              <a:buFont typeface="Wingdings" panose="05000000000000000000" pitchFamily="2" charset="2"/>
-              <a:buChar char="q"/>
-            </a:pPr>
-            <a:r>
-              <a:rPr lang="ru-RU" sz="2200" dirty="0"/>
-              <a:t> </a:t>
-            </a:r>
-            <a:r>
-              <a:rPr lang="ru-RU" sz="2200" dirty="0" smtClean="0"/>
-              <a:t>Объем ОЗУ/стека.</a:t>
-            </a:r>
-          </a:p>
-          <a:p>
-            <a:pPr lvl="1">
-              <a:buFont typeface="Wingdings" panose="05000000000000000000" pitchFamily="2" charset="2"/>
-              <a:buChar char="q"/>
-            </a:pPr>
-            <a:r>
-              <a:rPr lang="ru-RU" sz="2200" dirty="0" smtClean="0"/>
-              <a:t>Размер микросхемы (</a:t>
-            </a:r>
-            <a:r>
-              <a:rPr lang="en-US" sz="2200" dirty="0" smtClean="0"/>
-              <a:t>GE)</a:t>
-            </a:r>
-            <a:r>
-              <a:rPr lang="ru-RU" sz="2200" dirty="0" smtClean="0"/>
-              <a:t> – определяется только на стенде.</a:t>
+              <a:t>узел – гарантировать достоверность и целостность (аутентификация)</a:t>
             </a:r>
           </a:p>
           <a:p>
@@ -9034,72 +9558,70 @@
               <a:buChar char="q"/>
             </a:pPr>
             <a:r>
+              <a:rPr lang="ru-RU" sz="2400" dirty="0" smtClean="0"/>
+              <a:t> Повторное </a:t>
+            </a:r>
+            <a:r>
               <a:rPr lang="ru-RU" sz="2400" dirty="0"/>
-              <a:t> </a:t>
+              <a:t>воспроизведение пакета – гарантировать </a:t>
             </a:r>
             <a:r>
               <a:rPr lang="ru-RU" sz="2400" dirty="0" smtClean="0"/>
-              <a:t>Программные ограничения:</a:t>
-            </a:r>
-          </a:p>
-          <a:p>
-            <a:pPr lvl="1">
+              <a:t>подлинность</a:t>
+            </a:r>
+          </a:p>
+          <a:p>
+            <a:pPr>
               <a:buFont typeface="Wingdings" panose="05000000000000000000" pitchFamily="2" charset="2"/>
               <a:buChar char="q"/>
             </a:pPr>
             <a:r>
-              <a:rPr lang="ru-RU" sz="2200" dirty="0" smtClean="0"/>
-              <a:t> Объем кода – определяется легко.</a:t>
-            </a:r>
-          </a:p>
-          <a:p>
-            <a:pPr lvl="1">
+              <a:rPr lang="ru-RU" sz="2400" dirty="0"/>
+              <a:t> </a:t>
+            </a:r>
+            <a:r>
+              <a:rPr lang="ru-RU" sz="2400" dirty="0" smtClean="0"/>
+              <a:t>Захват </a:t>
+            </a:r>
+            <a:r>
+              <a:rPr lang="ru-RU" sz="2400" dirty="0" smtClean="0"/>
+              <a:t>узла</a:t>
+            </a:r>
+            <a:r>
+              <a:rPr lang="en-US" sz="2400" dirty="0" smtClean="0"/>
+              <a:t> – </a:t>
+            </a:r>
+            <a:r>
+              <a:rPr lang="ru-RU" sz="2400" dirty="0" smtClean="0"/>
+              <a:t>(является </a:t>
+            </a:r>
+            <a:r>
+              <a:rPr lang="ru-RU" sz="2400" dirty="0" smtClean="0"/>
+              <a:t>набором большого количества разных угроз, </a:t>
+            </a:r>
+            <a:r>
+              <a:rPr lang="ru-RU" sz="2400" dirty="0" smtClean="0"/>
+              <a:t>)не </a:t>
+            </a:r>
+            <a:r>
+              <a:rPr lang="ru-RU" sz="2400" dirty="0" smtClean="0"/>
+              <a:t>рассматривается в работе</a:t>
+            </a:r>
+          </a:p>
+          <a:p>
+            <a:pPr>
               <a:buFont typeface="Wingdings" panose="05000000000000000000" pitchFamily="2" charset="2"/>
               <a:buChar char="q"/>
             </a:pPr>
             <a:r>
-              <a:rPr lang="ru-RU" sz="2200" dirty="0"/>
-              <a:t> </a:t>
-            </a:r>
-            <a:r>
-              <a:rPr lang="ru-RU" sz="2200" dirty="0" smtClean="0"/>
-              <a:t>Количество </a:t>
-            </a:r>
-            <a:r>
-              <a:rPr lang="ru-RU" sz="2200" dirty="0"/>
-              <a:t>потребляемой </a:t>
-            </a:r>
-            <a:r>
-              <a:rPr lang="ru-RU" sz="2200" dirty="0" smtClean="0"/>
-              <a:t>памяти/стека – </a:t>
-            </a:r>
-            <a:r>
-              <a:rPr lang="ru-RU" sz="2200" dirty="0"/>
-              <a:t>определяется по коду</a:t>
-            </a:r>
-            <a:r>
-              <a:rPr lang="ru-RU" sz="2200" dirty="0" smtClean="0"/>
-              <a:t>.</a:t>
-            </a:r>
-          </a:p>
-          <a:p>
-            <a:pPr lvl="1">
-              <a:buFont typeface="Wingdings" panose="05000000000000000000" pitchFamily="2" charset="2"/>
-              <a:buChar char="q"/>
-            </a:pPr>
-            <a:r>
-              <a:rPr lang="ru-RU" sz="2200" dirty="0"/>
-              <a:t> </a:t>
-            </a:r>
-            <a:r>
-              <a:rPr lang="ru-RU" sz="2200" dirty="0" smtClean="0"/>
-              <a:t>Производительность – будем тестировать</a:t>
-            </a:r>
-            <a:r>
               <a:rPr lang="ru-RU" sz="2400" dirty="0" smtClean="0"/>
-              <a:t>.</a:t>
-            </a:r>
-            <a:endParaRPr lang="ru-RU" sz="2200" dirty="0" smtClean="0"/>
+              <a:t> Атака </a:t>
+            </a:r>
+            <a:r>
+              <a:rPr lang="ru-RU" sz="2400" dirty="0" smtClean="0"/>
+              <a:t>по времени – защита может обеспечиваться реализацией, сложная задача</a:t>
+            </a:r>
+            <a:endParaRPr lang="ru-RU" sz="2400" dirty="0"/>
           </a:p>
         </p:txBody>
       </p:sp>
@@ -9174,7 +9696,7 @@
     </p:spTree>
     <p:extLst>
       <p:ext uri="{BB962C8B-B14F-4D97-AF65-F5344CB8AC3E}">
-        <p14:creationId xmlns:p14="http://schemas.microsoft.com/office/powerpoint/2010/main" val="1293842083"/>
+        <p14:creationId xmlns:p14="http://schemas.microsoft.com/office/powerpoint/2010/main" val="2303552777"/>
       </p:ext>
     </p:extLst>
   </p:cSld>
@@ -9225,27 +9747,7 @@
           <a:p>
             <a:r>
               <a:rPr lang="ru-RU" dirty="0" smtClean="0"/>
-              <a:t>Уровни</a:t>
-            </a:r>
-            <a:r>
-              <a:rPr lang="en-US" dirty="0" smtClean="0"/>
-              <a:t> </a:t>
-            </a:r>
-            <a:r>
-              <a:rPr lang="ru-RU" dirty="0" smtClean="0"/>
-              <a:t>системы</a:t>
-            </a:r>
-            <a:r>
-              <a:rPr lang="en-US" dirty="0" smtClean="0"/>
-              <a:t> </a:t>
-            </a:r>
-            <a:r>
-              <a:rPr lang="en-US" dirty="0" err="1" smtClean="0"/>
-              <a:t>IoT</a:t>
-            </a:r>
-            <a:r>
-              <a:rPr lang="ru-RU" dirty="0" smtClean="0"/>
-              <a:t> </a:t>
+              <a:t>Применение шифров для отражения угроз</a:t>
             </a:r>
             <a:endParaRPr lang="ru-RU" dirty="0"/>
           </a:p>
@@ -9269,162 +9771,156 @@
         </p:spPr>
         <p:txBody>
           <a:bodyPr>
-            <a:normAutofit/>
+            <a:normAutofit lnSpcReduction="10000"/>
           </a:bodyPr>
           <a:lstStyle/>
           <a:p>
             <a:pPr>
-              <a:spcAft>
-                <a:spcPts val="1800"/>
-              </a:spcAft>
               <a:buFont typeface="Wingdings" panose="05000000000000000000" pitchFamily="2" charset="2"/>
               <a:buChar char="q"/>
             </a:pPr>
             <a:r>
-              <a:rPr lang="en-US" sz="2400" dirty="0"/>
+              <a:rPr lang="ru-RU" sz="2400" dirty="0" smtClean="0"/>
+              <a:t>Достоверность и целостность (аутентификация) –</a:t>
+            </a:r>
+            <a:endParaRPr lang="en-US" sz="2400" dirty="0" smtClean="0"/>
+          </a:p>
+          <a:p>
+            <a:pPr marL="0" indent="0">
+              <a:buNone/>
+            </a:pPr>
+            <a:r>
+              <a:rPr lang="ru-RU" sz="2400" dirty="0" err="1" smtClean="0"/>
+              <a:t>Неинтерактивность</a:t>
+            </a:r>
+            <a:r>
+              <a:rPr lang="ru-RU" sz="2400" dirty="0" smtClean="0"/>
               <a:t> </a:t>
             </a:r>
             <a:r>
-              <a:rPr lang="ru-RU" sz="2400" dirty="0"/>
-              <a:t>У</a:t>
+              <a:rPr lang="en-US" sz="2400" dirty="0" smtClean="0"/>
+              <a:t>=&gt; </a:t>
+            </a:r>
+            <a:r>
+              <a:rPr lang="ru-RU" sz="2400" dirty="0" err="1" smtClean="0"/>
+              <a:t>хэш</a:t>
             </a:r>
             <a:r>
               <a:rPr lang="ru-RU" sz="2400" dirty="0" smtClean="0"/>
-              <a:t>ровень бизнес-логики</a:t>
-            </a:r>
-            <a:endParaRPr lang="en-US" sz="2400" dirty="0" smtClean="0"/>
+              <a:t> + цифровая подпись</a:t>
+            </a:r>
           </a:p>
           <a:p>
             <a:pPr>
-              <a:spcAft>
-                <a:spcPts val="1800"/>
-              </a:spcAft>
               <a:buFont typeface="Wingdings" panose="05000000000000000000" pitchFamily="2" charset="2"/>
               <a:buChar char="q"/>
             </a:pPr>
             <a:r>
-              <a:rPr lang="en-US" sz="2400" dirty="0"/>
+              <a:rPr lang="ru-RU" sz="2400" dirty="0"/>
               <a:t> </a:t>
             </a:r>
             <a:r>
-              <a:rPr lang="ru-RU" sz="2400" dirty="0"/>
-              <a:t>П</a:t>
-            </a:r>
-            <a:r>
               <a:rPr lang="ru-RU" sz="2400" dirty="0" smtClean="0"/>
-              <a:t>рикладной уровень</a:t>
-            </a:r>
-            <a:endParaRPr lang="en-US" sz="2400" dirty="0" smtClean="0"/>
+              <a:t>Подлинность – метка времени</a:t>
+            </a:r>
           </a:p>
           <a:p>
             <a:pPr>
-              <a:spcAft>
-                <a:spcPts val="1800"/>
-              </a:spcAft>
               <a:buFont typeface="Wingdings" panose="05000000000000000000" pitchFamily="2" charset="2"/>
               <a:buChar char="q"/>
             </a:pPr>
             <a:r>
-              <a:rPr lang="en-US" sz="2400" dirty="0"/>
-              <a:t> </a:t>
-            </a:r>
-            <a:r>
               <a:rPr lang="ru-RU" sz="2400" dirty="0"/>
-              <a:t>У</a:t>
-            </a:r>
-            <a:r>
-              <a:rPr lang="ru-RU" sz="2400" dirty="0" smtClean="0"/>
-              <a:t>ровень обработки</a:t>
-            </a:r>
-            <a:endParaRPr lang="en-US" sz="2400" dirty="0" smtClean="0"/>
-          </a:p>
-          <a:p>
-            <a:pPr>
-              <a:spcAft>
-                <a:spcPts val="1800"/>
-              </a:spcAft>
+              <a:t> Конфиденциальность </a:t>
+            </a:r>
+            <a:endParaRPr lang="ru-RU" sz="2400" dirty="0" smtClean="0"/>
+          </a:p>
+          <a:p>
+            <a:pPr lvl="1">
               <a:buFont typeface="Wingdings" panose="05000000000000000000" pitchFamily="2" charset="2"/>
               <a:buChar char="q"/>
             </a:pPr>
             <a:r>
-              <a:rPr lang="en-US" sz="2400" dirty="0"/>
+              <a:rPr lang="ru-RU" sz="2400" dirty="0"/>
               <a:t> </a:t>
             </a:r>
             <a:r>
-              <a:rPr lang="ru-RU" sz="2400" dirty="0"/>
-              <a:t>Т</a:t>
-            </a:r>
-            <a:r>
               <a:rPr lang="ru-RU" sz="2400" dirty="0" smtClean="0"/>
-              <a:t>ранспортный уровень</a:t>
-            </a:r>
-            <a:endParaRPr lang="en-US" sz="2400" dirty="0" smtClean="0"/>
-          </a:p>
-          <a:p>
-            <a:pPr>
-              <a:spcAft>
-                <a:spcPts val="1800"/>
-              </a:spcAft>
+              <a:t>Блочное шифры </a:t>
+            </a:r>
+            <a:r>
+              <a:rPr lang="en-US" sz="2400" dirty="0" smtClean="0"/>
+              <a:t>&gt; </a:t>
+            </a:r>
+            <a:r>
+              <a:rPr lang="ru-RU" sz="2400" dirty="0" smtClean="0"/>
+              <a:t>Потоковые шифры </a:t>
+            </a:r>
+            <a:r>
+              <a:rPr lang="en-US" sz="2400" dirty="0" smtClean="0"/>
+              <a:t>&gt; </a:t>
+            </a:r>
+            <a:r>
+              <a:rPr lang="ru-RU" sz="2400" dirty="0" smtClean="0"/>
+              <a:t>Асимметричные шифры</a:t>
+            </a:r>
+          </a:p>
+          <a:p>
+            <a:pPr lvl="1">
               <a:buFont typeface="Wingdings" panose="05000000000000000000" pitchFamily="2" charset="2"/>
               <a:buChar char="q"/>
             </a:pPr>
             <a:r>
-              <a:rPr lang="en-US" sz="2400" dirty="0"/>
+              <a:rPr lang="ru-RU" sz="2400" dirty="0"/>
               <a:t> </a:t>
             </a:r>
             <a:r>
-              <a:rPr lang="ru-RU" sz="2400" dirty="0"/>
-              <a:t>С</a:t>
-            </a:r>
-            <a:r>
               <a:rPr lang="ru-RU" sz="2400" dirty="0" smtClean="0"/>
-              <a:t>енсорный уровень                                                     </a:t>
-            </a:r>
-            <a:r>
-              <a:rPr lang="en-US" sz="2400" dirty="0" smtClean="0"/>
-              <a:t> </a:t>
-            </a:r>
-            <a:r>
-              <a:rPr lang="en-US" sz="2400" dirty="0" smtClean="0">
-                <a:sym typeface="Wingdings" panose="05000000000000000000" pitchFamily="2" charset="2"/>
-              </a:rPr>
-              <a:t> </a:t>
-            </a:r>
-            <a:r>
-              <a:rPr lang="ru-RU" sz="2400" dirty="0" smtClean="0">
-                <a:sym typeface="Wingdings" panose="05000000000000000000" pitchFamily="2" charset="2"/>
-              </a:rPr>
-              <a:t>Устройства </a:t>
-            </a:r>
-            <a:r>
-              <a:rPr lang="en-US" sz="2400" dirty="0" err="1" smtClean="0">
-                <a:sym typeface="Wingdings" panose="05000000000000000000" pitchFamily="2" charset="2"/>
-              </a:rPr>
-              <a:t>IoT</a:t>
-            </a:r>
-            <a:r>
-              <a:rPr lang="en-US" sz="2400" dirty="0" smtClean="0">
-                <a:sym typeface="Wingdings" panose="05000000000000000000" pitchFamily="2" charset="2"/>
-              </a:rPr>
-              <a:t> - </a:t>
-            </a:r>
-            <a:r>
-              <a:rPr lang="ru-RU" sz="2400" dirty="0" smtClean="0">
-                <a:sym typeface="Wingdings" panose="05000000000000000000" pitchFamily="2" charset="2"/>
-              </a:rPr>
-              <a:t>здесь</a:t>
-            </a:r>
-            <a:endParaRPr lang="ru-RU" sz="2400" dirty="0"/>
-          </a:p>
-          <a:p>
-            <a:pPr>
-              <a:spcAft>
-                <a:spcPts val="1800"/>
-              </a:spcAft>
+              <a:t>Ключевые недостатки потоковых – долгая инициализация и большое потребление памяти</a:t>
+            </a:r>
+          </a:p>
+          <a:p>
+            <a:pPr lvl="1">
               <a:buFont typeface="Wingdings" panose="05000000000000000000" pitchFamily="2" charset="2"/>
               <a:buChar char="q"/>
             </a:pPr>
-            <a:endParaRPr lang="ru-RU" sz="2400" dirty="0"/>
+            <a:r>
+              <a:rPr lang="ru-RU" sz="2400" dirty="0"/>
+              <a:t> </a:t>
+            </a:r>
+            <a:r>
+              <a:rPr lang="ru-RU" sz="2400" dirty="0" smtClean="0"/>
+              <a:t>Ключевые недостатки асимметричных – б</a:t>
+            </a:r>
+            <a:r>
+              <a:rPr lang="en-US" sz="2400" dirty="0" smtClean="0"/>
+              <a:t>ó</a:t>
+            </a:r>
+            <a:r>
+              <a:rPr lang="ru-RU" sz="2400" dirty="0" err="1" smtClean="0"/>
+              <a:t>льшая</a:t>
+            </a:r>
+            <a:r>
+              <a:rPr lang="ru-RU" sz="2400" dirty="0" smtClean="0"/>
+              <a:t> длина ключа, большее время шифрования (</a:t>
+            </a:r>
+            <a:r>
+              <a:rPr lang="ru-RU" sz="2400" dirty="0" err="1" smtClean="0"/>
+              <a:t>неисп</a:t>
+            </a:r>
+            <a:r>
+              <a:rPr lang="ru-RU" sz="2400" dirty="0" smtClean="0"/>
+              <a:t>. Преим. </a:t>
+            </a:r>
+            <a:r>
+              <a:rPr lang="ru-RU" sz="2400" dirty="0"/>
+              <a:t>- нет необходимости передачи секретного ключа, ключ дешифрования может хранить только одна </a:t>
+            </a:r>
+            <a:r>
+              <a:rPr lang="ru-RU" sz="2400" dirty="0" smtClean="0"/>
+              <a:t>сторона – для аутентификации)</a:t>
+            </a:r>
+            <a:endParaRPr lang="ru-RU" sz="2200" dirty="0"/>
           </a:p>
         </p:txBody>
       </p:sp>
@@ -9496,121 +9992,10 @@
           </a:p>
         </p:txBody>
       </p:sp>
-      <p:pic>
-        <p:nvPicPr>
-          <p:cNvPr id="5" name="Рисунок 4"/>
-          <p:cNvPicPr>
-            <a:picLocks noChangeAspect="1"/>
-          </p:cNvPicPr>
-          <p:nvPr/>
-        </p:nvPicPr>
-        <p:blipFill rotWithShape="1">
-          <a:blip r:embed="rId2"/>
-          <a:srcRect t="1205"/>
-          <a:stretch/>
-        </p:blipFill>
-        <p:spPr>
-          <a:xfrm>
-            <a:off x="4799795" y="1780673"/>
-            <a:ext cx="2703246" cy="3479665"/>
-          </a:xfrm>
-          <a:prstGeom prst="rect">
-            <a:avLst/>
-          </a:prstGeom>
-        </p:spPr>
-      </p:pic>
-      <p:sp>
-        <p:nvSpPr>
-          <p:cNvPr id="6" name="TextBox 5"/>
-          <p:cNvSpPr txBox="1"/>
-          <p:nvPr/>
-        </p:nvSpPr>
-        <p:spPr>
-          <a:xfrm>
-            <a:off x="4726003" y="5246967"/>
-            <a:ext cx="6256421" cy="1200329"/>
-          </a:xfrm>
-          <a:prstGeom prst="rect">
-            <a:avLst/>
-          </a:prstGeom>
-          <a:noFill/>
-        </p:spPr>
-        <p:txBody>
-          <a:bodyPr wrap="square" rtlCol="0">
-            <a:spAutoFit/>
-          </a:bodyPr>
-          <a:lstStyle/>
-          <a:p>
-            <a:r>
-              <a:rPr lang="ru-RU" dirty="0" smtClean="0"/>
-              <a:t>Изображение </a:t>
-            </a:r>
-            <a:r>
-              <a:rPr lang="ru-RU" dirty="0"/>
-              <a:t>взято из </a:t>
-            </a:r>
-            <a:r>
-              <a:rPr lang="ru-RU" dirty="0" smtClean="0"/>
-              <a:t>статьи</a:t>
-            </a:r>
-          </a:p>
-          <a:p>
-            <a:r>
-              <a:rPr lang="ru-RU" dirty="0" smtClean="0"/>
-              <a:t>«</a:t>
-            </a:r>
-            <a:r>
-              <a:rPr lang="en-US" dirty="0" smtClean="0"/>
-              <a:t>Internet </a:t>
-            </a:r>
-            <a:r>
-              <a:rPr lang="en-US" dirty="0"/>
-              <a:t>of Things: Architectures, Protocols, and Applications</a:t>
-            </a:r>
-            <a:r>
-              <a:rPr lang="ru-RU" dirty="0" smtClean="0"/>
-              <a:t>»</a:t>
-            </a:r>
-          </a:p>
-          <a:p>
-            <a:r>
-              <a:rPr lang="en-US" dirty="0" smtClean="0"/>
-              <a:t>by </a:t>
-            </a:r>
-            <a:r>
-              <a:rPr lang="en-US" dirty="0" err="1"/>
-              <a:t>Pallavi</a:t>
-            </a:r>
-            <a:r>
-              <a:rPr lang="en-US" dirty="0"/>
-              <a:t> </a:t>
-            </a:r>
-            <a:r>
-              <a:rPr lang="en-US" dirty="0" err="1"/>
-              <a:t>Sethi</a:t>
-            </a:r>
-            <a:r>
-              <a:rPr lang="en-US" dirty="0"/>
-              <a:t>, </a:t>
-            </a:r>
-            <a:r>
-              <a:rPr lang="en-US" dirty="0" err="1"/>
-              <a:t>Smruti</a:t>
-            </a:r>
-            <a:r>
-              <a:rPr lang="en-US" dirty="0"/>
-              <a:t> R. Sarangi</a:t>
-            </a:r>
-          </a:p>
-          <a:p>
-            <a:endParaRPr lang="ru-RU" dirty="0"/>
-          </a:p>
-        </p:txBody>
-      </p:sp>
     </p:spTree>
     <p:extLst>
       <p:ext uri="{BB962C8B-B14F-4D97-AF65-F5344CB8AC3E}">
-        <p14:creationId xmlns:p14="http://schemas.microsoft.com/office/powerpoint/2010/main" val="454217343"/>
+        <p14:creationId xmlns:p14="http://schemas.microsoft.com/office/powerpoint/2010/main" val="4003392376"/>
       </p:ext>
     </p:extLst>
   </p:cSld>
@@ -9661,7 +10046,7 @@
           <a:p>
             <a:r>
               <a:rPr lang="ru-RU" dirty="0" smtClean="0"/>
-              <a:t>Угрозы безопасности сенсорного уровня </a:t>
+              <a:t>Методология тестирования реализаций шифров</a:t>
             </a:r>
             <a:endParaRPr lang="ru-RU" dirty="0"/>
           </a:p>
@@ -9695,8 +10080,41 @@
             </a:pPr>
             <a:r>
               <a:rPr lang="ru-RU" sz="2400" dirty="0" smtClean="0"/>
-              <a:t> Подслушивание</a:t>
-            </a:r>
+              <a:t> </a:t>
+            </a:r>
+            <a:r>
+              <a:rPr lang="ru-RU" sz="2400" dirty="0" smtClean="0"/>
+              <a:t>Тестируемые характеристики:</a:t>
+            </a:r>
+          </a:p>
+          <a:p>
+            <a:pPr lvl="1">
+              <a:buFont typeface="Wingdings" panose="05000000000000000000" pitchFamily="2" charset="2"/>
+              <a:buChar char="q"/>
+            </a:pPr>
+            <a:r>
+              <a:rPr lang="ru-RU" sz="2200" dirty="0" smtClean="0"/>
+              <a:t> Производительность </a:t>
+            </a:r>
+            <a:r>
+              <a:rPr lang="ru-RU" sz="2200" dirty="0" smtClean="0"/>
+              <a:t>= задержка + пропускная способность</a:t>
+            </a:r>
+          </a:p>
+          <a:p>
+            <a:pPr lvl="1">
+              <a:buFont typeface="Wingdings" panose="05000000000000000000" pitchFamily="2" charset="2"/>
+              <a:buChar char="q"/>
+            </a:pPr>
+            <a:r>
+              <a:rPr lang="ru-RU" sz="2200" dirty="0"/>
+              <a:t> </a:t>
+            </a:r>
+            <a:r>
+              <a:rPr lang="ru-RU" sz="2200" dirty="0" smtClean="0"/>
+              <a:t>Мощность энергопотребления (Ватт)</a:t>
+            </a:r>
+            <a:endParaRPr lang="ru-RU" sz="2200" dirty="0"/>
           </a:p>
           <a:p>
             <a:pPr>
@@ -9704,12 +10122,36 @@
               <a:buChar char="q"/>
             </a:pPr>
             <a:r>
-              <a:rPr lang="ru-RU" sz="2400" dirty="0"/>
+              <a:rPr lang="ru-RU" sz="2200" dirty="0" smtClean="0"/>
               <a:t> </a:t>
             </a:r>
             <a:r>
-              <a:rPr lang="ru-RU" sz="2400" dirty="0" smtClean="0"/>
-              <a:t>Захват узла</a:t>
+              <a:rPr lang="ru-RU" sz="2200" dirty="0" smtClean="0"/>
+              <a:t>Тестирование времени:</a:t>
+            </a:r>
+          </a:p>
+          <a:p>
+            <a:pPr lvl="1">
+              <a:buFont typeface="Wingdings" panose="05000000000000000000" pitchFamily="2" charset="2"/>
+              <a:buChar char="q"/>
+            </a:pPr>
+            <a:r>
+              <a:rPr lang="ru-RU" dirty="0"/>
+              <a:t> </a:t>
+            </a:r>
+            <a:r>
+              <a:rPr lang="ru-RU" dirty="0" smtClean="0"/>
+              <a:t>Рекомендуется на ассемблере (регистры, задержки, простые инструкции)</a:t>
+            </a:r>
+          </a:p>
+          <a:p>
+            <a:pPr lvl="1">
+              <a:buFont typeface="Wingdings" panose="05000000000000000000" pitchFamily="2" charset="2"/>
+              <a:buChar char="q"/>
+            </a:pPr>
+            <a:r>
+              <a:rPr lang="ru-RU" dirty="0" smtClean="0"/>
+              <a:t> Рекомендуется целиком (не по инструкциям)</a:t>
             </a:r>
           </a:p>
           <a:p>
@@ -9718,42 +10160,60 @@
               <a:buChar char="q"/>
             </a:pPr>
             <a:r>
-              <a:rPr lang="ru-RU" sz="2400" dirty="0"/>
+              <a:rPr lang="ru-RU" dirty="0"/>
               <a:t> </a:t>
             </a:r>
             <a:r>
-              <a:rPr lang="ru-RU" sz="2400" dirty="0" smtClean="0"/>
-              <a:t>Фальшивый узел</a:t>
-            </a:r>
-          </a:p>
-          <a:p>
-            <a:pPr>
+              <a:rPr lang="ru-RU" dirty="0" smtClean="0"/>
+              <a:t>Тестирование мощности энергопотребления</a:t>
+            </a:r>
+          </a:p>
+          <a:p>
+            <a:pPr lvl="1">
               <a:buFont typeface="Wingdings" panose="05000000000000000000" pitchFamily="2" charset="2"/>
               <a:buChar char="q"/>
             </a:pPr>
             <a:r>
-              <a:rPr lang="ru-RU" sz="2400" dirty="0"/>
+              <a:rPr lang="ru-RU" dirty="0"/>
               <a:t> </a:t>
             </a:r>
             <a:r>
-              <a:rPr lang="ru-RU" sz="2400" dirty="0" smtClean="0"/>
-              <a:t>Повторное воспроизведение пакета</a:t>
-            </a:r>
-          </a:p>
-          <a:p>
-            <a:pPr>
+              <a:rPr lang="ru-RU" dirty="0" smtClean="0"/>
+              <a:t>Измеряется на входе системной платы (для ЦП отдельный разъе</a:t>
+            </a:r>
+            <a:r>
+              <a:rPr lang="ru-RU" dirty="0" smtClean="0"/>
+              <a:t>м)</a:t>
+            </a:r>
+          </a:p>
+          <a:p>
+            <a:pPr lvl="1">
               <a:buFont typeface="Wingdings" panose="05000000000000000000" pitchFamily="2" charset="2"/>
               <a:buChar char="q"/>
             </a:pPr>
             <a:r>
-              <a:rPr lang="ru-RU" sz="2400" dirty="0"/>
+              <a:rPr lang="ru-RU" dirty="0"/>
               <a:t> </a:t>
             </a:r>
             <a:r>
-              <a:rPr lang="ru-RU" sz="2400" dirty="0" smtClean="0"/>
-              <a:t>Атака по времени</a:t>
-            </a:r>
-            <a:endParaRPr lang="ru-RU" sz="2400" dirty="0"/>
+              <a:rPr lang="ru-RU" dirty="0" smtClean="0"/>
+              <a:t>Выражается из формулы</a:t>
+            </a:r>
+          </a:p>
+          <a:p>
+            <a:pPr lvl="1">
+              <a:buFont typeface="Wingdings" panose="05000000000000000000" pitchFamily="2" charset="2"/>
+              <a:buChar char="q"/>
+            </a:pPr>
+            <a:r>
+              <a:rPr lang="ru-RU" dirty="0"/>
+              <a:t> </a:t>
+            </a:r>
+            <a:r>
+              <a:rPr lang="ru-RU" dirty="0" smtClean="0"/>
+              <a:t>Можно как целиком, так и по инструкциям</a:t>
+            </a:r>
+            <a:endParaRPr lang="ru-RU" dirty="0"/>
           </a:p>
         </p:txBody>
       </p:sp>
@@ -9825,10 +10285,33 @@
           </a:p>
         </p:txBody>
       </p:sp>
+      <p:pic>
+        <p:nvPicPr>
+          <p:cNvPr id="5" name="Рисунок 4"/>
+          <p:cNvPicPr>
+            <a:picLocks noChangeAspect="1"/>
+          </p:cNvPicPr>
+          <p:nvPr/>
+        </p:nvPicPr>
+        <p:blipFill rotWithShape="1">
+          <a:blip r:embed="rId2"/>
+          <a:srcRect l="4732" t="19568" r="3785" b="22464"/>
+          <a:stretch/>
+        </p:blipFill>
+        <p:spPr>
+          <a:xfrm>
+            <a:off x="6234546" y="4858327"/>
+            <a:ext cx="4020688" cy="434110"/>
+          </a:xfrm>
+          <a:prstGeom prst="rect">
+            <a:avLst/>
+          </a:prstGeom>
+        </p:spPr>
+      </p:pic>
     </p:spTree>
     <p:extLst>
       <p:ext uri="{BB962C8B-B14F-4D97-AF65-F5344CB8AC3E}">
-        <p14:creationId xmlns:p14="http://schemas.microsoft.com/office/powerpoint/2010/main" val="474734714"/>
+        <p14:creationId xmlns:p14="http://schemas.microsoft.com/office/powerpoint/2010/main" val="1689523132"/>
       </p:ext>
     </p:extLst>
   </p:cSld>
@@ -9879,7 +10362,7 @@
           <a:p>
             <a:r>
               <a:rPr lang="ru-RU" dirty="0" smtClean="0"/>
-              <a:t>Угрозы безопасности сенсорного уровня – как отразить?</a:t>
+              <a:t>Методология тестирования реализаций шифров</a:t>
             </a:r>
             <a:endParaRPr lang="ru-RU" dirty="0"/>
           </a:p>
@@ -9913,8 +10396,74 @@
             </a:pPr>
             <a:r>
               <a:rPr lang="ru-RU" sz="2400" dirty="0" smtClean="0"/>
-              <a:t> Подслушивание – конфиденциальность</a:t>
-            </a:r>
+              <a:t>Достоинства</a:t>
+            </a:r>
+            <a:r>
+              <a:rPr lang="ru-RU" sz="2400" dirty="0" smtClean="0"/>
+              <a:t>:</a:t>
+            </a:r>
+          </a:p>
+          <a:p>
+            <a:pPr lvl="1">
+              <a:buFont typeface="Wingdings" panose="05000000000000000000" pitchFamily="2" charset="2"/>
+              <a:buChar char="q"/>
+            </a:pPr>
+            <a:r>
+              <a:rPr lang="ru-RU" sz="2200" dirty="0"/>
+              <a:t> </a:t>
+            </a:r>
+            <a:r>
+              <a:rPr lang="ru-RU" sz="2200" dirty="0" smtClean="0"/>
+              <a:t>Подходит для ПК, не требует серьезного </a:t>
+            </a:r>
+            <a:r>
+              <a:rPr lang="ru-RU" sz="2200" dirty="0" smtClean="0"/>
+              <a:t>оборудования и стендовой реализации</a:t>
+            </a:r>
+            <a:endParaRPr lang="ru-RU" sz="2200" dirty="0" smtClean="0"/>
+          </a:p>
+          <a:p>
+            <a:pPr lvl="1">
+              <a:buFont typeface="Wingdings" panose="05000000000000000000" pitchFamily="2" charset="2"/>
+              <a:buChar char="q"/>
+            </a:pPr>
+            <a:r>
+              <a:rPr lang="ru-RU" sz="2200" dirty="0"/>
+              <a:t> </a:t>
+            </a:r>
+            <a:r>
+              <a:rPr lang="ru-RU" sz="2200" dirty="0" smtClean="0"/>
+              <a:t>Позволяет добиться достаточно низкой погрешности</a:t>
+            </a:r>
+          </a:p>
+          <a:p>
+            <a:pPr lvl="1">
+              <a:buFont typeface="Wingdings" panose="05000000000000000000" pitchFamily="2" charset="2"/>
+              <a:buChar char="q"/>
+            </a:pPr>
+            <a:r>
+              <a:rPr lang="ru-RU" sz="2200" dirty="0"/>
+              <a:t> </a:t>
+            </a:r>
+            <a:r>
+              <a:rPr lang="ru-RU" sz="2200" dirty="0" smtClean="0"/>
+              <a:t>Робастность (далее)</a:t>
+            </a:r>
+          </a:p>
+          <a:p>
+            <a:pPr lvl="1">
+              <a:buFont typeface="Wingdings" panose="05000000000000000000" pitchFamily="2" charset="2"/>
+              <a:buChar char="q"/>
+            </a:pPr>
+            <a:r>
+              <a:rPr lang="ru-RU" sz="2200" dirty="0"/>
+              <a:t> </a:t>
+            </a:r>
+            <a:r>
+              <a:rPr lang="ru-RU" sz="2200" dirty="0" smtClean="0"/>
+              <a:t>На исследованном участке – устойчивость к изменению диапазона (далее)</a:t>
+            </a:r>
+            <a:endParaRPr lang="ru-RU" sz="2200" dirty="0"/>
           </a:p>
           <a:p>
             <a:pPr>
@@ -9922,64 +10471,58 @@
               <a:buChar char="q"/>
             </a:pPr>
             <a:r>
-              <a:rPr lang="ru-RU" sz="2400" dirty="0"/>
+              <a:rPr lang="ru-RU" sz="2200" dirty="0" smtClean="0"/>
               <a:t> </a:t>
             </a:r>
             <a:r>
               <a:rPr lang="ru-RU" sz="2400" dirty="0" smtClean="0"/>
-              <a:t>Захват узла</a:t>
-            </a:r>
-            <a:r>
-              <a:rPr lang="en-US" sz="2400" dirty="0" smtClean="0"/>
-              <a:t> – </a:t>
-            </a:r>
-            <a:r>
-              <a:rPr lang="ru-RU" sz="2400" dirty="0" smtClean="0"/>
-              <a:t>является набором большого количества разных угроз, не рассматривается в работе</a:t>
-            </a:r>
-          </a:p>
-          <a:p>
-            <a:pPr>
+              <a:t>Недостатки</a:t>
+            </a:r>
+            <a:r>
+              <a:rPr lang="ru-RU" sz="2200" dirty="0" smtClean="0"/>
+              <a:t>:</a:t>
+            </a:r>
+          </a:p>
+          <a:p>
+            <a:pPr lvl="1">
               <a:buFont typeface="Wingdings" panose="05000000000000000000" pitchFamily="2" charset="2"/>
               <a:buChar char="q"/>
             </a:pPr>
             <a:r>
-              <a:rPr lang="ru-RU" sz="2400" dirty="0"/>
+              <a:rPr lang="ru-RU" sz="2200" dirty="0"/>
               <a:t> </a:t>
             </a:r>
             <a:r>
-              <a:rPr lang="ru-RU" sz="2400" dirty="0" smtClean="0"/>
-              <a:t>Фальшивый узел – достоверность и целостность (аутентификация)</a:t>
-            </a:r>
-          </a:p>
-          <a:p>
-            <a:pPr>
+              <a:rPr lang="ru-RU" sz="2200" dirty="0" smtClean="0"/>
+              <a:t>Отсутствие самодостаточности (сначала – </a:t>
+            </a:r>
+            <a:r>
+              <a:rPr lang="ru-RU" sz="2200" dirty="0" err="1" smtClean="0"/>
+              <a:t>криптоанализ</a:t>
+            </a:r>
+            <a:r>
+              <a:rPr lang="ru-RU" sz="2200" dirty="0" smtClean="0"/>
+              <a:t>)</a:t>
+            </a:r>
+          </a:p>
+          <a:p>
+            <a:pPr lvl="1">
               <a:buFont typeface="Wingdings" panose="05000000000000000000" pitchFamily="2" charset="2"/>
               <a:buChar char="q"/>
             </a:pPr>
             <a:r>
-              <a:rPr lang="ru-RU" sz="2400" dirty="0"/>
+              <a:rPr lang="ru-RU" sz="2200" dirty="0"/>
               <a:t> </a:t>
             </a:r>
             <a:r>
-              <a:rPr lang="ru-RU" sz="2400" dirty="0" smtClean="0"/>
-              <a:t>Повторное воспроизведение пакета – подлинность</a:t>
-            </a:r>
-          </a:p>
-          <a:p>
-            <a:pPr>
-              <a:buFont typeface="Wingdings" panose="05000000000000000000" pitchFamily="2" charset="2"/>
-              <a:buChar char="q"/>
-            </a:pPr>
-            <a:r>
-              <a:rPr lang="ru-RU" sz="2400" dirty="0"/>
-              <a:t> </a:t>
-            </a:r>
-            <a:r>
-              <a:rPr lang="ru-RU" sz="2400" dirty="0" smtClean="0"/>
-              <a:t>Атака по времени – защита может обеспечиваться реализацией, сложная задача</a:t>
-            </a:r>
-            <a:endParaRPr lang="ru-RU" sz="2400" dirty="0"/>
+              <a:rPr lang="ru-RU" sz="2200" dirty="0" smtClean="0"/>
+              <a:t>Требует известной аккуратности, ассемблерная реализация – достаточно трудоемкое </a:t>
+            </a:r>
+            <a:r>
+              <a:rPr lang="ru-RU" sz="2200" dirty="0" smtClean="0"/>
+              <a:t>дело</a:t>
+            </a:r>
+            <a:endParaRPr lang="ru-RU" sz="2200" dirty="0"/>
           </a:p>
         </p:txBody>
       </p:sp>
@@ -10054,7 +10597,7 @@
     </p:spTree>
     <p:extLst>
       <p:ext uri="{BB962C8B-B14F-4D97-AF65-F5344CB8AC3E}">
-        <p14:creationId xmlns:p14="http://schemas.microsoft.com/office/powerpoint/2010/main" val="2303552777"/>
+        <p14:creationId xmlns:p14="http://schemas.microsoft.com/office/powerpoint/2010/main" val="881357635"/>
       </p:ext>
     </p:extLst>
   </p:cSld>

</xml_diff>